<commit_message>
Fixing reading order of the slide text objects.
</commit_message>
<xml_diff>
--- a/Whiteboard design session/WDS trainer presentation - Machine Learning.pptx
+++ b/Whiteboard design session/WDS trainer presentation - Machine Learning.pptx
@@ -237,7 +237,7 @@
           <a:p>
             <a:fld id="{52A13B17-C506-4D51-BB37-16B365906619}" type="datetimeFigureOut">
               <a:rPr lang="en-US" smtClean="0"/>
-              <a:t>12/8/2019</a:t>
+              <a:t>12/10/2019</a:t>
             </a:fld>
             <a:endParaRPr lang="en-US" dirty="0"/>
           </a:p>
@@ -2726,7 +2726,7 @@
                   <a:prstClr val="black"/>
                 </a:solidFill>
               </a:rPr>
-              <a:t>12/8/2019 7:35 PM</a:t>
+              <a:t>12/10/2019 11:35 AM</a:t>
             </a:fld>
             <a:endParaRPr lang="en-US" dirty="0">
               <a:solidFill>
@@ -16823,6 +16823,49 @@
       </p:grpSpPr>
       <p:sp>
         <p:nvSpPr>
+          <p:cNvPr id="2" name="Title 1"/>
+          <p:cNvSpPr>
+            <a:spLocks noGrp="1"/>
+          </p:cNvSpPr>
+          <p:nvPr>
+            <p:ph type="title"/>
+          </p:nvPr>
+        </p:nvSpPr>
+        <p:spPr/>
+        <p:txBody>
+          <a:bodyPr>
+            <a:normAutofit fontScale="90000"/>
+          </a:bodyPr>
+          <a:lstStyle/>
+          <a:p>
+            <a:r>
+              <a:rPr lang="en-US" sz="4900" dirty="0">
+                <a:solidFill>
+                  <a:schemeClr val="tx1"/>
+                </a:solidFill>
+                <a:cs typeface="Segoe UI" panose="020B0502040204020203" pitchFamily="34" charset="0"/>
+              </a:rPr>
+              <a:t>Preferred target audience</a:t>
+            </a:r>
+            <a:br>
+              <a:rPr lang="en-US" dirty="0">
+                <a:solidFill>
+                  <a:schemeClr val="tx1"/>
+                </a:solidFill>
+                <a:latin typeface="Segoe UI" panose="020B0502040204020203" pitchFamily="34" charset="0"/>
+              </a:rPr>
+            </a:br>
+            <a:endParaRPr lang="en-US" sz="3236" dirty="0">
+              <a:solidFill>
+                <a:schemeClr val="tx1"/>
+              </a:solidFill>
+              <a:latin typeface="Segoe UI" panose="020B0502040204020203" pitchFamily="34" charset="0"/>
+            </a:endParaRPr>
+          </a:p>
+        </p:txBody>
+      </p:sp>
+      <p:sp>
+        <p:nvSpPr>
           <p:cNvPr id="3" name="Content Placeholder 2"/>
           <p:cNvSpPr>
             <a:spLocks noGrp="1"/>
@@ -16874,49 +16917,6 @@
               <a:solidFill>
                 <a:schemeClr val="tx1"/>
               </a:solidFill>
-            </a:endParaRPr>
-          </a:p>
-        </p:txBody>
-      </p:sp>
-      <p:sp>
-        <p:nvSpPr>
-          <p:cNvPr id="2" name="Title 1"/>
-          <p:cNvSpPr>
-            <a:spLocks noGrp="1"/>
-          </p:cNvSpPr>
-          <p:nvPr>
-            <p:ph type="title"/>
-          </p:nvPr>
-        </p:nvSpPr>
-        <p:spPr/>
-        <p:txBody>
-          <a:bodyPr>
-            <a:normAutofit fontScale="90000"/>
-          </a:bodyPr>
-          <a:lstStyle/>
-          <a:p>
-            <a:r>
-              <a:rPr lang="en-US" sz="4900" dirty="0">
-                <a:solidFill>
-                  <a:schemeClr val="tx1"/>
-                </a:solidFill>
-                <a:cs typeface="Segoe UI" panose="020B0502040204020203" pitchFamily="34" charset="0"/>
-              </a:rPr>
-              <a:t>Preferred target audience</a:t>
-            </a:r>
-            <a:br>
-              <a:rPr lang="en-US" dirty="0">
-                <a:solidFill>
-                  <a:schemeClr val="tx1"/>
-                </a:solidFill>
-                <a:latin typeface="Segoe UI" panose="020B0502040204020203" pitchFamily="34" charset="0"/>
-              </a:rPr>
-            </a:br>
-            <a:endParaRPr lang="en-US" sz="3236" dirty="0">
-              <a:solidFill>
-                <a:schemeClr val="tx1"/>
-              </a:solidFill>
-              <a:latin typeface="Segoe UI" panose="020B0502040204020203" pitchFamily="34" charset="0"/>
             </a:endParaRPr>
           </a:p>
         </p:txBody>
@@ -17078,6 +17078,40 @@
       </p:grpSpPr>
       <p:sp>
         <p:nvSpPr>
+          <p:cNvPr id="2" name="Title 1"/>
+          <p:cNvSpPr>
+            <a:spLocks noGrp="1"/>
+          </p:cNvSpPr>
+          <p:nvPr>
+            <p:ph type="title"/>
+          </p:nvPr>
+        </p:nvSpPr>
+        <p:spPr/>
+        <p:txBody>
+          <a:bodyPr>
+            <a:normAutofit fontScale="90000"/>
+          </a:bodyPr>
+          <a:lstStyle/>
+          <a:p>
+            <a:r>
+              <a:rPr lang="en-US" sz="4900" dirty="0">
+                <a:solidFill>
+                  <a:schemeClr val="tx1"/>
+                </a:solidFill>
+              </a:rPr>
+              <a:t>Preferred solution – classify component descriptions text data</a:t>
+            </a:r>
+            <a:endParaRPr lang="en-US" sz="3236" dirty="0">
+              <a:solidFill>
+                <a:schemeClr val="tx1"/>
+              </a:solidFill>
+              <a:latin typeface="Segoe UI" panose="020B0502040204020203" pitchFamily="34" charset="0"/>
+            </a:endParaRPr>
+          </a:p>
+        </p:txBody>
+      </p:sp>
+      <p:sp>
+        <p:nvSpPr>
           <p:cNvPr id="3" name="Content Placeholder 2"/>
           <p:cNvSpPr>
             <a:spLocks noGrp="1"/>
@@ -17170,40 +17204,6 @@
               <a:solidFill>
                 <a:schemeClr val="tx1"/>
               </a:solidFill>
-            </a:endParaRPr>
-          </a:p>
-        </p:txBody>
-      </p:sp>
-      <p:sp>
-        <p:nvSpPr>
-          <p:cNvPr id="2" name="Title 1"/>
-          <p:cNvSpPr>
-            <a:spLocks noGrp="1"/>
-          </p:cNvSpPr>
-          <p:nvPr>
-            <p:ph type="title"/>
-          </p:nvPr>
-        </p:nvSpPr>
-        <p:spPr/>
-        <p:txBody>
-          <a:bodyPr>
-            <a:normAutofit fontScale="90000"/>
-          </a:bodyPr>
-          <a:lstStyle/>
-          <a:p>
-            <a:r>
-              <a:rPr lang="en-US" sz="4900" dirty="0">
-                <a:solidFill>
-                  <a:schemeClr val="tx1"/>
-                </a:solidFill>
-              </a:rPr>
-              <a:t>Preferred solution – classify component descriptions text data</a:t>
-            </a:r>
-            <a:endParaRPr lang="en-US" sz="3236" dirty="0">
-              <a:solidFill>
-                <a:schemeClr val="tx1"/>
-              </a:solidFill>
-              <a:latin typeface="Segoe UI" panose="020B0502040204020203" pitchFamily="34" charset="0"/>
             </a:endParaRPr>
           </a:p>
         </p:txBody>
@@ -17248,6 +17248,57 @@
       </p:grpSpPr>
       <p:sp>
         <p:nvSpPr>
+          <p:cNvPr id="2" name="Title 1"/>
+          <p:cNvSpPr>
+            <a:spLocks noGrp="1"/>
+          </p:cNvSpPr>
+          <p:nvPr>
+            <p:ph type="title"/>
+          </p:nvPr>
+        </p:nvSpPr>
+        <p:spPr/>
+        <p:txBody>
+          <a:bodyPr>
+            <a:normAutofit fontScale="90000"/>
+          </a:bodyPr>
+          <a:lstStyle/>
+          <a:p>
+            <a:r>
+              <a:rPr lang="en-US" sz="4900" dirty="0">
+                <a:solidFill>
+                  <a:schemeClr val="tx1"/>
+                </a:solidFill>
+              </a:rPr>
+              <a:t>Preferred solution – classify component descriptions text data</a:t>
+            </a:r>
+            <a:r>
+              <a:rPr lang="en-US" sz="4900" dirty="0">
+                <a:solidFill>
+                  <a:schemeClr val="tx1"/>
+                </a:solidFill>
+                <a:cs typeface="Segoe UI" panose="020B0502040204020203" pitchFamily="34" charset="0"/>
+              </a:rPr>
+              <a:t> (continued)</a:t>
+            </a:r>
+            <a:br>
+              <a:rPr lang="en-US" dirty="0">
+                <a:solidFill>
+                  <a:schemeClr val="tx1"/>
+                </a:solidFill>
+                <a:latin typeface="Segoe UI" panose="020B0502040204020203" pitchFamily="34" charset="0"/>
+              </a:rPr>
+            </a:br>
+            <a:endParaRPr lang="en-US" sz="3236" dirty="0">
+              <a:solidFill>
+                <a:schemeClr val="tx1"/>
+              </a:solidFill>
+              <a:latin typeface="Segoe UI" panose="020B0502040204020203" pitchFamily="34" charset="0"/>
+            </a:endParaRPr>
+          </a:p>
+        </p:txBody>
+      </p:sp>
+      <p:sp>
+        <p:nvSpPr>
           <p:cNvPr id="3" name="Content Placeholder 2"/>
           <p:cNvSpPr>
             <a:spLocks noGrp="1"/>
@@ -17378,57 +17429,6 @@
               <a:solidFill>
                 <a:schemeClr val="tx1"/>
               </a:solidFill>
-            </a:endParaRPr>
-          </a:p>
-        </p:txBody>
-      </p:sp>
-      <p:sp>
-        <p:nvSpPr>
-          <p:cNvPr id="2" name="Title 1"/>
-          <p:cNvSpPr>
-            <a:spLocks noGrp="1"/>
-          </p:cNvSpPr>
-          <p:nvPr>
-            <p:ph type="title"/>
-          </p:nvPr>
-        </p:nvSpPr>
-        <p:spPr/>
-        <p:txBody>
-          <a:bodyPr>
-            <a:normAutofit fontScale="90000"/>
-          </a:bodyPr>
-          <a:lstStyle/>
-          <a:p>
-            <a:r>
-              <a:rPr lang="en-US" sz="4900" dirty="0">
-                <a:solidFill>
-                  <a:schemeClr val="tx1"/>
-                </a:solidFill>
-              </a:rPr>
-              <a:t>Preferred solution – classify component descriptions text data</a:t>
-            </a:r>
-            <a:r>
-              <a:rPr lang="en-US" sz="4900" dirty="0">
-                <a:solidFill>
-                  <a:schemeClr val="tx1"/>
-                </a:solidFill>
-                <a:cs typeface="Segoe UI" panose="020B0502040204020203" pitchFamily="34" charset="0"/>
-              </a:rPr>
-              <a:t> (continued)</a:t>
-            </a:r>
-            <a:br>
-              <a:rPr lang="en-US" dirty="0">
-                <a:solidFill>
-                  <a:schemeClr val="tx1"/>
-                </a:solidFill>
-                <a:latin typeface="Segoe UI" panose="020B0502040204020203" pitchFamily="34" charset="0"/>
-              </a:rPr>
-            </a:br>
-            <a:endParaRPr lang="en-US" sz="3236" dirty="0">
-              <a:solidFill>
-                <a:schemeClr val="tx1"/>
-              </a:solidFill>
-              <a:latin typeface="Segoe UI" panose="020B0502040204020203" pitchFamily="34" charset="0"/>
             </a:endParaRPr>
           </a:p>
         </p:txBody>
@@ -17473,6 +17473,49 @@
       </p:grpSpPr>
       <p:sp>
         <p:nvSpPr>
+          <p:cNvPr id="2" name="Title 1"/>
+          <p:cNvSpPr>
+            <a:spLocks noGrp="1"/>
+          </p:cNvSpPr>
+          <p:nvPr>
+            <p:ph type="title"/>
+          </p:nvPr>
+        </p:nvSpPr>
+        <p:spPr/>
+        <p:txBody>
+          <a:bodyPr>
+            <a:normAutofit fontScale="90000"/>
+          </a:bodyPr>
+          <a:lstStyle/>
+          <a:p>
+            <a:r>
+              <a:rPr lang="en-US" sz="4900" dirty="0">
+                <a:solidFill>
+                  <a:schemeClr val="tx1"/>
+                </a:solidFill>
+                <a:cs typeface="Segoe UI" panose="020B0502040204020203" pitchFamily="34" charset="0"/>
+              </a:rPr>
+              <a:t>Preferred solution – forecasting battery failure</a:t>
+            </a:r>
+            <a:br>
+              <a:rPr lang="en-US" dirty="0">
+                <a:solidFill>
+                  <a:schemeClr val="tx1"/>
+                </a:solidFill>
+                <a:latin typeface="Segoe UI" panose="020B0502040204020203" pitchFamily="34" charset="0"/>
+              </a:rPr>
+            </a:br>
+            <a:endParaRPr lang="en-US" sz="3236" dirty="0">
+              <a:solidFill>
+                <a:schemeClr val="tx1"/>
+              </a:solidFill>
+              <a:latin typeface="Segoe UI" panose="020B0502040204020203" pitchFamily="34" charset="0"/>
+            </a:endParaRPr>
+          </a:p>
+        </p:txBody>
+      </p:sp>
+      <p:sp>
+        <p:nvSpPr>
           <p:cNvPr id="3" name="Content Placeholder 2"/>
           <p:cNvSpPr>
             <a:spLocks noGrp="1"/>
@@ -17595,49 +17638,6 @@
               <a:solidFill>
                 <a:schemeClr val="tx1"/>
               </a:solidFill>
-            </a:endParaRPr>
-          </a:p>
-        </p:txBody>
-      </p:sp>
-      <p:sp>
-        <p:nvSpPr>
-          <p:cNvPr id="2" name="Title 1"/>
-          <p:cNvSpPr>
-            <a:spLocks noGrp="1"/>
-          </p:cNvSpPr>
-          <p:nvPr>
-            <p:ph type="title"/>
-          </p:nvPr>
-        </p:nvSpPr>
-        <p:spPr/>
-        <p:txBody>
-          <a:bodyPr>
-            <a:normAutofit fontScale="90000"/>
-          </a:bodyPr>
-          <a:lstStyle/>
-          <a:p>
-            <a:r>
-              <a:rPr lang="en-US" sz="4900" dirty="0">
-                <a:solidFill>
-                  <a:schemeClr val="tx1"/>
-                </a:solidFill>
-                <a:cs typeface="Segoe UI" panose="020B0502040204020203" pitchFamily="34" charset="0"/>
-              </a:rPr>
-              <a:t>Preferred solution – forecasting battery failure</a:t>
-            </a:r>
-            <a:br>
-              <a:rPr lang="en-US" dirty="0">
-                <a:solidFill>
-                  <a:schemeClr val="tx1"/>
-                </a:solidFill>
-                <a:latin typeface="Segoe UI" panose="020B0502040204020203" pitchFamily="34" charset="0"/>
-              </a:rPr>
-            </a:br>
-            <a:endParaRPr lang="en-US" sz="3236" dirty="0">
-              <a:solidFill>
-                <a:schemeClr val="tx1"/>
-              </a:solidFill>
-              <a:latin typeface="Segoe UI" panose="020B0502040204020203" pitchFamily="34" charset="0"/>
             </a:endParaRPr>
           </a:p>
         </p:txBody>
@@ -17813,6 +17813,49 @@
       </p:grpSpPr>
       <p:sp>
         <p:nvSpPr>
+          <p:cNvPr id="2" name="Title 1"/>
+          <p:cNvSpPr>
+            <a:spLocks noGrp="1"/>
+          </p:cNvSpPr>
+          <p:nvPr>
+            <p:ph type="title"/>
+          </p:nvPr>
+        </p:nvSpPr>
+        <p:spPr/>
+        <p:txBody>
+          <a:bodyPr>
+            <a:normAutofit fontScale="90000"/>
+          </a:bodyPr>
+          <a:lstStyle/>
+          <a:p>
+            <a:r>
+              <a:rPr lang="en-US" sz="4900" dirty="0">
+                <a:solidFill>
+                  <a:schemeClr val="tx1"/>
+                </a:solidFill>
+                <a:cs typeface="Segoe UI" panose="020B0502040204020203" pitchFamily="34" charset="0"/>
+              </a:rPr>
+              <a:t>Preferred solution – forecasting battery failure (continued)</a:t>
+            </a:r>
+            <a:br>
+              <a:rPr lang="en-US" dirty="0">
+                <a:solidFill>
+                  <a:schemeClr val="tx1"/>
+                </a:solidFill>
+                <a:latin typeface="Segoe UI" panose="020B0502040204020203" pitchFamily="34" charset="0"/>
+              </a:rPr>
+            </a:br>
+            <a:endParaRPr lang="en-US" sz="3236" dirty="0">
+              <a:solidFill>
+                <a:schemeClr val="tx1"/>
+              </a:solidFill>
+              <a:latin typeface="Segoe UI" panose="020B0502040204020203" pitchFamily="34" charset="0"/>
+            </a:endParaRPr>
+          </a:p>
+        </p:txBody>
+      </p:sp>
+      <p:sp>
+        <p:nvSpPr>
           <p:cNvPr id="3" name="Content Placeholder 2"/>
           <p:cNvSpPr>
             <a:spLocks noGrp="1"/>
@@ -17905,49 +17948,6 @@
               <a:solidFill>
                 <a:schemeClr val="tx1"/>
               </a:solidFill>
-            </a:endParaRPr>
-          </a:p>
-        </p:txBody>
-      </p:sp>
-      <p:sp>
-        <p:nvSpPr>
-          <p:cNvPr id="2" name="Title 1"/>
-          <p:cNvSpPr>
-            <a:spLocks noGrp="1"/>
-          </p:cNvSpPr>
-          <p:nvPr>
-            <p:ph type="title"/>
-          </p:nvPr>
-        </p:nvSpPr>
-        <p:spPr/>
-        <p:txBody>
-          <a:bodyPr>
-            <a:normAutofit fontScale="90000"/>
-          </a:bodyPr>
-          <a:lstStyle/>
-          <a:p>
-            <a:r>
-              <a:rPr lang="en-US" sz="4900" dirty="0">
-                <a:solidFill>
-                  <a:schemeClr val="tx1"/>
-                </a:solidFill>
-                <a:cs typeface="Segoe UI" panose="020B0502040204020203" pitchFamily="34" charset="0"/>
-              </a:rPr>
-              <a:t>Preferred solution – forecasting battery failure (continued)</a:t>
-            </a:r>
-            <a:br>
-              <a:rPr lang="en-US" dirty="0">
-                <a:solidFill>
-                  <a:schemeClr val="tx1"/>
-                </a:solidFill>
-                <a:latin typeface="Segoe UI" panose="020B0502040204020203" pitchFamily="34" charset="0"/>
-              </a:rPr>
-            </a:br>
-            <a:endParaRPr lang="en-US" sz="3236" dirty="0">
-              <a:solidFill>
-                <a:schemeClr val="tx1"/>
-              </a:solidFill>
-              <a:latin typeface="Segoe UI" panose="020B0502040204020203" pitchFamily="34" charset="0"/>
             </a:endParaRPr>
           </a:p>
         </p:txBody>
@@ -17992,6 +17992,49 @@
       </p:grpSpPr>
       <p:sp>
         <p:nvSpPr>
+          <p:cNvPr id="2" name="Title 1"/>
+          <p:cNvSpPr>
+            <a:spLocks noGrp="1"/>
+          </p:cNvSpPr>
+          <p:nvPr>
+            <p:ph type="title"/>
+          </p:nvPr>
+        </p:nvSpPr>
+        <p:spPr/>
+        <p:txBody>
+          <a:bodyPr>
+            <a:normAutofit fontScale="90000"/>
+          </a:bodyPr>
+          <a:lstStyle/>
+          <a:p>
+            <a:r>
+              <a:rPr lang="en-US" sz="4900" dirty="0">
+                <a:solidFill>
+                  <a:schemeClr val="tx1"/>
+                </a:solidFill>
+                <a:cs typeface="Segoe UI" panose="020B0502040204020203" pitchFamily="34" charset="0"/>
+              </a:rPr>
+              <a:t>Preferred solution – automated machine learning</a:t>
+            </a:r>
+            <a:br>
+              <a:rPr lang="en-US" dirty="0">
+                <a:solidFill>
+                  <a:schemeClr val="tx1"/>
+                </a:solidFill>
+                <a:latin typeface="Segoe UI" panose="020B0502040204020203" pitchFamily="34" charset="0"/>
+              </a:rPr>
+            </a:br>
+            <a:endParaRPr lang="en-US" sz="3236" dirty="0">
+              <a:solidFill>
+                <a:schemeClr val="tx1"/>
+              </a:solidFill>
+              <a:latin typeface="Segoe UI" panose="020B0502040204020203" pitchFamily="34" charset="0"/>
+            </a:endParaRPr>
+          </a:p>
+        </p:txBody>
+      </p:sp>
+      <p:sp>
+        <p:nvSpPr>
           <p:cNvPr id="3" name="Content Placeholder 2"/>
           <p:cNvSpPr>
             <a:spLocks noGrp="1"/>
@@ -18106,49 +18149,6 @@
               <a:solidFill>
                 <a:schemeClr val="tx1"/>
               </a:solidFill>
-            </a:endParaRPr>
-          </a:p>
-        </p:txBody>
-      </p:sp>
-      <p:sp>
-        <p:nvSpPr>
-          <p:cNvPr id="2" name="Title 1"/>
-          <p:cNvSpPr>
-            <a:spLocks noGrp="1"/>
-          </p:cNvSpPr>
-          <p:nvPr>
-            <p:ph type="title"/>
-          </p:nvPr>
-        </p:nvSpPr>
-        <p:spPr/>
-        <p:txBody>
-          <a:bodyPr>
-            <a:normAutofit fontScale="90000"/>
-          </a:bodyPr>
-          <a:lstStyle/>
-          <a:p>
-            <a:r>
-              <a:rPr lang="en-US" sz="4900" dirty="0">
-                <a:solidFill>
-                  <a:schemeClr val="tx1"/>
-                </a:solidFill>
-                <a:cs typeface="Segoe UI" panose="020B0502040204020203" pitchFamily="34" charset="0"/>
-              </a:rPr>
-              <a:t>Preferred solution – automated machine learning</a:t>
-            </a:r>
-            <a:br>
-              <a:rPr lang="en-US" dirty="0">
-                <a:solidFill>
-                  <a:schemeClr val="tx1"/>
-                </a:solidFill>
-                <a:latin typeface="Segoe UI" panose="020B0502040204020203" pitchFamily="34" charset="0"/>
-              </a:rPr>
-            </a:br>
-            <a:endParaRPr lang="en-US" sz="3236" dirty="0">
-              <a:solidFill>
-                <a:schemeClr val="tx1"/>
-              </a:solidFill>
-              <a:latin typeface="Segoe UI" panose="020B0502040204020203" pitchFamily="34" charset="0"/>
             </a:endParaRPr>
           </a:p>
         </p:txBody>
@@ -18193,6 +18193,49 @@
       </p:grpSpPr>
       <p:sp>
         <p:nvSpPr>
+          <p:cNvPr id="2" name="Title 1"/>
+          <p:cNvSpPr>
+            <a:spLocks noGrp="1"/>
+          </p:cNvSpPr>
+          <p:nvPr>
+            <p:ph type="title"/>
+          </p:nvPr>
+        </p:nvSpPr>
+        <p:spPr/>
+        <p:txBody>
+          <a:bodyPr>
+            <a:normAutofit fontScale="90000"/>
+          </a:bodyPr>
+          <a:lstStyle/>
+          <a:p>
+            <a:r>
+              <a:rPr lang="en-US" sz="4900" dirty="0">
+                <a:solidFill>
+                  <a:schemeClr val="tx1"/>
+                </a:solidFill>
+                <a:cs typeface="Segoe UI" panose="020B0502040204020203" pitchFamily="34" charset="0"/>
+              </a:rPr>
+              <a:t>Preferred solution – model management</a:t>
+            </a:r>
+            <a:br>
+              <a:rPr lang="en-US" dirty="0">
+                <a:solidFill>
+                  <a:schemeClr val="tx1"/>
+                </a:solidFill>
+                <a:latin typeface="Segoe UI" panose="020B0502040204020203" pitchFamily="34" charset="0"/>
+              </a:rPr>
+            </a:br>
+            <a:endParaRPr lang="en-US" sz="3236" dirty="0">
+              <a:solidFill>
+                <a:schemeClr val="tx1"/>
+              </a:solidFill>
+              <a:latin typeface="Segoe UI" panose="020B0502040204020203" pitchFamily="34" charset="0"/>
+            </a:endParaRPr>
+          </a:p>
+        </p:txBody>
+      </p:sp>
+      <p:sp>
+        <p:nvSpPr>
           <p:cNvPr id="3" name="Content Placeholder 2"/>
           <p:cNvSpPr>
             <a:spLocks noGrp="1"/>
@@ -18283,49 +18326,6 @@
               <a:buNone/>
             </a:pPr>
             <a:endParaRPr lang="en-US" sz="1800" b="1" i="1" dirty="0"/>
-          </a:p>
-        </p:txBody>
-      </p:sp>
-      <p:sp>
-        <p:nvSpPr>
-          <p:cNvPr id="2" name="Title 1"/>
-          <p:cNvSpPr>
-            <a:spLocks noGrp="1"/>
-          </p:cNvSpPr>
-          <p:nvPr>
-            <p:ph type="title"/>
-          </p:nvPr>
-        </p:nvSpPr>
-        <p:spPr/>
-        <p:txBody>
-          <a:bodyPr>
-            <a:normAutofit fontScale="90000"/>
-          </a:bodyPr>
-          <a:lstStyle/>
-          <a:p>
-            <a:r>
-              <a:rPr lang="en-US" sz="4900" dirty="0">
-                <a:solidFill>
-                  <a:schemeClr val="tx1"/>
-                </a:solidFill>
-                <a:cs typeface="Segoe UI" panose="020B0502040204020203" pitchFamily="34" charset="0"/>
-              </a:rPr>
-              <a:t>Preferred solution – model management</a:t>
-            </a:r>
-            <a:br>
-              <a:rPr lang="en-US" dirty="0">
-                <a:solidFill>
-                  <a:schemeClr val="tx1"/>
-                </a:solidFill>
-                <a:latin typeface="Segoe UI" panose="020B0502040204020203" pitchFamily="34" charset="0"/>
-              </a:rPr>
-            </a:br>
-            <a:endParaRPr lang="en-US" sz="3236" dirty="0">
-              <a:solidFill>
-                <a:schemeClr val="tx1"/>
-              </a:solidFill>
-              <a:latin typeface="Segoe UI" panose="020B0502040204020203" pitchFamily="34" charset="0"/>
-            </a:endParaRPr>
           </a:p>
         </p:txBody>
       </p:sp>
@@ -18369,6 +18369,49 @@
       </p:grpSpPr>
       <p:sp>
         <p:nvSpPr>
+          <p:cNvPr id="2" name="Title 1"/>
+          <p:cNvSpPr>
+            <a:spLocks noGrp="1"/>
+          </p:cNvSpPr>
+          <p:nvPr>
+            <p:ph type="title"/>
+          </p:nvPr>
+        </p:nvSpPr>
+        <p:spPr/>
+        <p:txBody>
+          <a:bodyPr>
+            <a:normAutofit fontScale="90000"/>
+          </a:bodyPr>
+          <a:lstStyle/>
+          <a:p>
+            <a:r>
+              <a:rPr lang="en-US" sz="4900" dirty="0">
+                <a:solidFill>
+                  <a:schemeClr val="tx1"/>
+                </a:solidFill>
+                <a:cs typeface="Segoe UI" panose="020B0502040204020203" pitchFamily="34" charset="0"/>
+              </a:rPr>
+              <a:t>Preferred solution – model management (continued)</a:t>
+            </a:r>
+            <a:br>
+              <a:rPr lang="en-US" dirty="0">
+                <a:solidFill>
+                  <a:schemeClr val="tx1"/>
+                </a:solidFill>
+                <a:latin typeface="Segoe UI" panose="020B0502040204020203" pitchFamily="34" charset="0"/>
+              </a:rPr>
+            </a:br>
+            <a:endParaRPr lang="en-US" sz="3236" dirty="0">
+              <a:solidFill>
+                <a:schemeClr val="tx1"/>
+              </a:solidFill>
+              <a:latin typeface="Segoe UI" panose="020B0502040204020203" pitchFamily="34" charset="0"/>
+            </a:endParaRPr>
+          </a:p>
+        </p:txBody>
+      </p:sp>
+      <p:sp>
+        <p:nvSpPr>
           <p:cNvPr id="3" name="Content Placeholder 2"/>
           <p:cNvSpPr>
             <a:spLocks noGrp="1"/>
@@ -18422,49 +18465,6 @@
               <a:solidFill>
                 <a:schemeClr val="tx1"/>
               </a:solidFill>
-            </a:endParaRPr>
-          </a:p>
-        </p:txBody>
-      </p:sp>
-      <p:sp>
-        <p:nvSpPr>
-          <p:cNvPr id="2" name="Title 1"/>
-          <p:cNvSpPr>
-            <a:spLocks noGrp="1"/>
-          </p:cNvSpPr>
-          <p:nvPr>
-            <p:ph type="title"/>
-          </p:nvPr>
-        </p:nvSpPr>
-        <p:spPr/>
-        <p:txBody>
-          <a:bodyPr>
-            <a:normAutofit fontScale="90000"/>
-          </a:bodyPr>
-          <a:lstStyle/>
-          <a:p>
-            <a:r>
-              <a:rPr lang="en-US" sz="4900" dirty="0">
-                <a:solidFill>
-                  <a:schemeClr val="tx1"/>
-                </a:solidFill>
-                <a:cs typeface="Segoe UI" panose="020B0502040204020203" pitchFamily="34" charset="0"/>
-              </a:rPr>
-              <a:t>Preferred solution – model management (continued)</a:t>
-            </a:r>
-            <a:br>
-              <a:rPr lang="en-US" dirty="0">
-                <a:solidFill>
-                  <a:schemeClr val="tx1"/>
-                </a:solidFill>
-                <a:latin typeface="Segoe UI" panose="020B0502040204020203" pitchFamily="34" charset="0"/>
-              </a:rPr>
-            </a:br>
-            <a:endParaRPr lang="en-US" sz="3236" dirty="0">
-              <a:solidFill>
-                <a:schemeClr val="tx1"/>
-              </a:solidFill>
-              <a:latin typeface="Segoe UI" panose="020B0502040204020203" pitchFamily="34" charset="0"/>
             </a:endParaRPr>
           </a:p>
         </p:txBody>
@@ -18509,6 +18509,49 @@
       </p:grpSpPr>
       <p:sp>
         <p:nvSpPr>
+          <p:cNvPr id="2" name="Title 1"/>
+          <p:cNvSpPr>
+            <a:spLocks noGrp="1"/>
+          </p:cNvSpPr>
+          <p:nvPr>
+            <p:ph type="title"/>
+          </p:nvPr>
+        </p:nvSpPr>
+        <p:spPr/>
+        <p:txBody>
+          <a:bodyPr>
+            <a:normAutofit fontScale="90000"/>
+          </a:bodyPr>
+          <a:lstStyle/>
+          <a:p>
+            <a:r>
+              <a:rPr lang="en-US" sz="4900" dirty="0">
+                <a:solidFill>
+                  <a:schemeClr val="tx1"/>
+                </a:solidFill>
+                <a:cs typeface="Segoe UI" panose="020B0502040204020203" pitchFamily="34" charset="0"/>
+              </a:rPr>
+              <a:t>Preferred solution – model explainability and reproducibility</a:t>
+            </a:r>
+            <a:br>
+              <a:rPr lang="en-US" dirty="0">
+                <a:solidFill>
+                  <a:schemeClr val="tx1"/>
+                </a:solidFill>
+                <a:latin typeface="Segoe UI" panose="020B0502040204020203" pitchFamily="34" charset="0"/>
+              </a:rPr>
+            </a:br>
+            <a:endParaRPr lang="en-US" sz="3236" dirty="0">
+              <a:solidFill>
+                <a:schemeClr val="tx1"/>
+              </a:solidFill>
+              <a:latin typeface="Segoe UI" panose="020B0502040204020203" pitchFamily="34" charset="0"/>
+            </a:endParaRPr>
+          </a:p>
+        </p:txBody>
+      </p:sp>
+      <p:sp>
+        <p:nvSpPr>
           <p:cNvPr id="3" name="Content Placeholder 2"/>
           <p:cNvSpPr>
             <a:spLocks noGrp="1"/>
@@ -18589,49 +18632,6 @@
               <a:solidFill>
                 <a:schemeClr val="tx1"/>
               </a:solidFill>
-            </a:endParaRPr>
-          </a:p>
-        </p:txBody>
-      </p:sp>
-      <p:sp>
-        <p:nvSpPr>
-          <p:cNvPr id="2" name="Title 1"/>
-          <p:cNvSpPr>
-            <a:spLocks noGrp="1"/>
-          </p:cNvSpPr>
-          <p:nvPr>
-            <p:ph type="title"/>
-          </p:nvPr>
-        </p:nvSpPr>
-        <p:spPr/>
-        <p:txBody>
-          <a:bodyPr>
-            <a:normAutofit fontScale="90000"/>
-          </a:bodyPr>
-          <a:lstStyle/>
-          <a:p>
-            <a:r>
-              <a:rPr lang="en-US" sz="4900" dirty="0">
-                <a:solidFill>
-                  <a:schemeClr val="tx1"/>
-                </a:solidFill>
-                <a:cs typeface="Segoe UI" panose="020B0502040204020203" pitchFamily="34" charset="0"/>
-              </a:rPr>
-              <a:t>Preferred solution – model explainability and reproducibility</a:t>
-            </a:r>
-            <a:br>
-              <a:rPr lang="en-US" dirty="0">
-                <a:solidFill>
-                  <a:schemeClr val="tx1"/>
-                </a:solidFill>
-                <a:latin typeface="Segoe UI" panose="020B0502040204020203" pitchFamily="34" charset="0"/>
-              </a:rPr>
-            </a:br>
-            <a:endParaRPr lang="en-US" sz="3236" dirty="0">
-              <a:solidFill>
-                <a:schemeClr val="tx1"/>
-              </a:solidFill>
-              <a:latin typeface="Segoe UI" panose="020B0502040204020203" pitchFamily="34" charset="0"/>
             </a:endParaRPr>
           </a:p>
         </p:txBody>
@@ -18676,6 +18676,48 @@
       </p:grpSpPr>
       <p:sp>
         <p:nvSpPr>
+          <p:cNvPr id="2" name="Title 1"/>
+          <p:cNvSpPr>
+            <a:spLocks noGrp="1"/>
+          </p:cNvSpPr>
+          <p:nvPr>
+            <p:ph type="title"/>
+          </p:nvPr>
+        </p:nvSpPr>
+        <p:spPr/>
+        <p:txBody>
+          <a:bodyPr>
+            <a:normAutofit fontScale="90000"/>
+          </a:bodyPr>
+          <a:lstStyle/>
+          <a:p>
+            <a:r>
+              <a:rPr lang="en-US" sz="4900" dirty="0">
+                <a:solidFill>
+                  <a:schemeClr val="tx1"/>
+                </a:solidFill>
+              </a:rPr>
+              <a:t>Preferred solution – model explainability and reproducibility (continued)</a:t>
+            </a:r>
+            <a:br>
+              <a:rPr lang="en-US" dirty="0">
+                <a:solidFill>
+                  <a:schemeClr val="tx1"/>
+                </a:solidFill>
+                <a:latin typeface="Segoe UI" panose="020B0502040204020203" pitchFamily="34" charset="0"/>
+              </a:rPr>
+            </a:br>
+            <a:endParaRPr lang="en-US" sz="3236" dirty="0">
+              <a:solidFill>
+                <a:schemeClr val="tx1"/>
+              </a:solidFill>
+              <a:latin typeface="Segoe UI" panose="020B0502040204020203" pitchFamily="34" charset="0"/>
+            </a:endParaRPr>
+          </a:p>
+        </p:txBody>
+      </p:sp>
+      <p:sp>
+        <p:nvSpPr>
           <p:cNvPr id="3" name="Content Placeholder 2"/>
           <p:cNvSpPr>
             <a:spLocks noGrp="1"/>
@@ -18736,48 +18778,6 @@
               <a:rPr lang="en-US" sz="2000" dirty="0"/>
               <a:t>Machine learning pipelines encapsulate the steps taken to from input training data, to trained model, as well as to go from input data to scored result. Pipelines package these steps into reusable objects. Azure Machine Learning and the SDK support the creation, registration and execution of pipelines. The use of pipelines does increase the reproducibility of being able to re-create a model or re-execute an inference in a way that helps to guarantee fidelity across all executions. Trey could author Azure Machine Learning pipelines in notebooks using the Azure Machine Learning Python SDK.</a:t>
             </a:r>
-          </a:p>
-        </p:txBody>
-      </p:sp>
-      <p:sp>
-        <p:nvSpPr>
-          <p:cNvPr id="2" name="Title 1"/>
-          <p:cNvSpPr>
-            <a:spLocks noGrp="1"/>
-          </p:cNvSpPr>
-          <p:nvPr>
-            <p:ph type="title"/>
-          </p:nvPr>
-        </p:nvSpPr>
-        <p:spPr/>
-        <p:txBody>
-          <a:bodyPr>
-            <a:normAutofit fontScale="90000"/>
-          </a:bodyPr>
-          <a:lstStyle/>
-          <a:p>
-            <a:r>
-              <a:rPr lang="en-US" sz="4900" dirty="0">
-                <a:solidFill>
-                  <a:schemeClr val="tx1"/>
-                </a:solidFill>
-              </a:rPr>
-              <a:t>Preferred solution – model explainability and reproducibility (continued)</a:t>
-            </a:r>
-            <a:br>
-              <a:rPr lang="en-US" dirty="0">
-                <a:solidFill>
-                  <a:schemeClr val="tx1"/>
-                </a:solidFill>
-                <a:latin typeface="Segoe UI" panose="020B0502040204020203" pitchFamily="34" charset="0"/>
-              </a:rPr>
-            </a:br>
-            <a:endParaRPr lang="en-US" sz="3236" dirty="0">
-              <a:solidFill>
-                <a:schemeClr val="tx1"/>
-              </a:solidFill>
-              <a:latin typeface="Segoe UI" panose="020B0502040204020203" pitchFamily="34" charset="0"/>
-            </a:endParaRPr>
           </a:p>
         </p:txBody>
       </p:sp>
@@ -18821,6 +18821,49 @@
       </p:grpSpPr>
       <p:sp>
         <p:nvSpPr>
+          <p:cNvPr id="2" name="Title 1"/>
+          <p:cNvSpPr>
+            <a:spLocks noGrp="1"/>
+          </p:cNvSpPr>
+          <p:nvPr>
+            <p:ph type="title"/>
+          </p:nvPr>
+        </p:nvSpPr>
+        <p:spPr/>
+        <p:txBody>
+          <a:bodyPr>
+            <a:normAutofit fontScale="90000"/>
+          </a:bodyPr>
+          <a:lstStyle/>
+          <a:p>
+            <a:r>
+              <a:rPr lang="en-US" sz="4900" dirty="0">
+                <a:solidFill>
+                  <a:schemeClr val="tx1"/>
+                </a:solidFill>
+                <a:cs typeface="Segoe UI" panose="020B0502040204020203" pitchFamily="34" charset="0"/>
+              </a:rPr>
+              <a:t>Preferred solution – enabling visualization</a:t>
+            </a:r>
+            <a:br>
+              <a:rPr lang="en-US" dirty="0">
+                <a:solidFill>
+                  <a:schemeClr val="tx1"/>
+                </a:solidFill>
+                <a:latin typeface="Segoe UI" panose="020B0502040204020203" pitchFamily="34" charset="0"/>
+              </a:rPr>
+            </a:br>
+            <a:endParaRPr lang="en-US" sz="3236" dirty="0">
+              <a:solidFill>
+                <a:schemeClr val="tx1"/>
+              </a:solidFill>
+              <a:latin typeface="Segoe UI" panose="020B0502040204020203" pitchFamily="34" charset="0"/>
+            </a:endParaRPr>
+          </a:p>
+        </p:txBody>
+      </p:sp>
+      <p:sp>
+        <p:nvSpPr>
           <p:cNvPr id="3" name="Content Placeholder 2"/>
           <p:cNvSpPr>
             <a:spLocks noGrp="1"/>
@@ -18906,49 +18949,6 @@
               <a:rPr lang="en-US" sz="2000" dirty="0"/>
               <a:t>While Trey could create simplified notebooks and even dashboards using Azure Databricks notebooks, its is more likely that business analysts would be more comfortable using Power BI, which is why it is important to ensure the scored results are made available in a service datastore compatible with Power BI like Cosmos DB.</a:t>
             </a:r>
-          </a:p>
-        </p:txBody>
-      </p:sp>
-      <p:sp>
-        <p:nvSpPr>
-          <p:cNvPr id="2" name="Title 1"/>
-          <p:cNvSpPr>
-            <a:spLocks noGrp="1"/>
-          </p:cNvSpPr>
-          <p:nvPr>
-            <p:ph type="title"/>
-          </p:nvPr>
-        </p:nvSpPr>
-        <p:spPr/>
-        <p:txBody>
-          <a:bodyPr>
-            <a:normAutofit fontScale="90000"/>
-          </a:bodyPr>
-          <a:lstStyle/>
-          <a:p>
-            <a:r>
-              <a:rPr lang="en-US" sz="4900" dirty="0">
-                <a:solidFill>
-                  <a:schemeClr val="tx1"/>
-                </a:solidFill>
-                <a:cs typeface="Segoe UI" panose="020B0502040204020203" pitchFamily="34" charset="0"/>
-              </a:rPr>
-              <a:t>Preferred solution – enabling visualization</a:t>
-            </a:r>
-            <a:br>
-              <a:rPr lang="en-US" dirty="0">
-                <a:solidFill>
-                  <a:schemeClr val="tx1"/>
-                </a:solidFill>
-                <a:latin typeface="Segoe UI" panose="020B0502040204020203" pitchFamily="34" charset="0"/>
-              </a:rPr>
-            </a:br>
-            <a:endParaRPr lang="en-US" sz="3236" dirty="0">
-              <a:solidFill>
-                <a:schemeClr val="tx1"/>
-              </a:solidFill>
-              <a:latin typeface="Segoe UI" panose="020B0502040204020203" pitchFamily="34" charset="0"/>
-            </a:endParaRPr>
           </a:p>
         </p:txBody>
       </p:sp>
@@ -18992,6 +18992,49 @@
       </p:grpSpPr>
       <p:sp>
         <p:nvSpPr>
+          <p:cNvPr id="2" name="Title 1"/>
+          <p:cNvSpPr>
+            <a:spLocks noGrp="1"/>
+          </p:cNvSpPr>
+          <p:nvPr>
+            <p:ph type="title"/>
+          </p:nvPr>
+        </p:nvSpPr>
+        <p:spPr/>
+        <p:txBody>
+          <a:bodyPr>
+            <a:normAutofit fontScale="90000"/>
+          </a:bodyPr>
+          <a:lstStyle/>
+          <a:p>
+            <a:r>
+              <a:rPr lang="en-US" sz="4900" dirty="0">
+                <a:solidFill>
+                  <a:schemeClr val="tx1"/>
+                </a:solidFill>
+                <a:cs typeface="Segoe UI" panose="020B0502040204020203" pitchFamily="34" charset="0"/>
+              </a:rPr>
+              <a:t>Preferred objections handling (1, 2)</a:t>
+            </a:r>
+            <a:br>
+              <a:rPr lang="en-US" dirty="0">
+                <a:solidFill>
+                  <a:schemeClr val="tx1"/>
+                </a:solidFill>
+                <a:latin typeface="Segoe UI" panose="020B0502040204020203" pitchFamily="34" charset="0"/>
+              </a:rPr>
+            </a:br>
+            <a:endParaRPr lang="en-US" sz="3236" dirty="0">
+              <a:solidFill>
+                <a:schemeClr val="tx1"/>
+              </a:solidFill>
+              <a:latin typeface="Segoe UI" panose="020B0502040204020203" pitchFamily="34" charset="0"/>
+            </a:endParaRPr>
+          </a:p>
+        </p:txBody>
+      </p:sp>
+      <p:sp>
+        <p:nvSpPr>
           <p:cNvPr id="3" name="Content Placeholder 2"/>
           <p:cNvSpPr>
             <a:spLocks noGrp="1"/>
@@ -19104,49 +19147,6 @@
               <a:solidFill>
                 <a:schemeClr val="tx1"/>
               </a:solidFill>
-            </a:endParaRPr>
-          </a:p>
-        </p:txBody>
-      </p:sp>
-      <p:sp>
-        <p:nvSpPr>
-          <p:cNvPr id="2" name="Title 1"/>
-          <p:cNvSpPr>
-            <a:spLocks noGrp="1"/>
-          </p:cNvSpPr>
-          <p:nvPr>
-            <p:ph type="title"/>
-          </p:nvPr>
-        </p:nvSpPr>
-        <p:spPr/>
-        <p:txBody>
-          <a:bodyPr>
-            <a:normAutofit fontScale="90000"/>
-          </a:bodyPr>
-          <a:lstStyle/>
-          <a:p>
-            <a:r>
-              <a:rPr lang="en-US" sz="4900" dirty="0">
-                <a:solidFill>
-                  <a:schemeClr val="tx1"/>
-                </a:solidFill>
-                <a:cs typeface="Segoe UI" panose="020B0502040204020203" pitchFamily="34" charset="0"/>
-              </a:rPr>
-              <a:t>Preferred objections handling (1, 2)</a:t>
-            </a:r>
-            <a:br>
-              <a:rPr lang="en-US" dirty="0">
-                <a:solidFill>
-                  <a:schemeClr val="tx1"/>
-                </a:solidFill>
-                <a:latin typeface="Segoe UI" panose="020B0502040204020203" pitchFamily="34" charset="0"/>
-              </a:rPr>
-            </a:br>
-            <a:endParaRPr lang="en-US" sz="3236" dirty="0">
-              <a:solidFill>
-                <a:schemeClr val="tx1"/>
-              </a:solidFill>
-              <a:latin typeface="Segoe UI" panose="020B0502040204020203" pitchFamily="34" charset="0"/>
             </a:endParaRPr>
           </a:p>
         </p:txBody>
@@ -19191,6 +19191,49 @@
       </p:grpSpPr>
       <p:sp>
         <p:nvSpPr>
+          <p:cNvPr id="2" name="Title 1"/>
+          <p:cNvSpPr>
+            <a:spLocks noGrp="1"/>
+          </p:cNvSpPr>
+          <p:nvPr>
+            <p:ph type="title"/>
+          </p:nvPr>
+        </p:nvSpPr>
+        <p:spPr/>
+        <p:txBody>
+          <a:bodyPr>
+            <a:normAutofit fontScale="90000"/>
+          </a:bodyPr>
+          <a:lstStyle/>
+          <a:p>
+            <a:r>
+              <a:rPr lang="en-US" sz="4900" dirty="0">
+                <a:solidFill>
+                  <a:schemeClr val="tx1"/>
+                </a:solidFill>
+                <a:cs typeface="Segoe UI" panose="020B0502040204020203" pitchFamily="34" charset="0"/>
+              </a:rPr>
+              <a:t>Preferred objections handling (3)</a:t>
+            </a:r>
+            <a:br>
+              <a:rPr lang="en-US" dirty="0">
+                <a:solidFill>
+                  <a:schemeClr val="tx1"/>
+                </a:solidFill>
+                <a:latin typeface="Segoe UI" panose="020B0502040204020203" pitchFamily="34" charset="0"/>
+              </a:rPr>
+            </a:br>
+            <a:endParaRPr lang="en-US" sz="3236" dirty="0">
+              <a:solidFill>
+                <a:schemeClr val="tx1"/>
+              </a:solidFill>
+              <a:latin typeface="Segoe UI" panose="020B0502040204020203" pitchFamily="34" charset="0"/>
+            </a:endParaRPr>
+          </a:p>
+        </p:txBody>
+      </p:sp>
+      <p:sp>
+        <p:nvSpPr>
           <p:cNvPr id="3" name="Content Placeholder 2"/>
           <p:cNvSpPr>
             <a:spLocks noGrp="1"/>
@@ -19282,49 +19325,6 @@
               <a:solidFill>
                 <a:schemeClr val="tx1"/>
               </a:solidFill>
-            </a:endParaRPr>
-          </a:p>
-        </p:txBody>
-      </p:sp>
-      <p:sp>
-        <p:nvSpPr>
-          <p:cNvPr id="2" name="Title 1"/>
-          <p:cNvSpPr>
-            <a:spLocks noGrp="1"/>
-          </p:cNvSpPr>
-          <p:nvPr>
-            <p:ph type="title"/>
-          </p:nvPr>
-        </p:nvSpPr>
-        <p:spPr/>
-        <p:txBody>
-          <a:bodyPr>
-            <a:normAutofit fontScale="90000"/>
-          </a:bodyPr>
-          <a:lstStyle/>
-          <a:p>
-            <a:r>
-              <a:rPr lang="en-US" sz="4900" dirty="0">
-                <a:solidFill>
-                  <a:schemeClr val="tx1"/>
-                </a:solidFill>
-                <a:cs typeface="Segoe UI" panose="020B0502040204020203" pitchFamily="34" charset="0"/>
-              </a:rPr>
-              <a:t>Preferred objections handling (3)</a:t>
-            </a:r>
-            <a:br>
-              <a:rPr lang="en-US" dirty="0">
-                <a:solidFill>
-                  <a:schemeClr val="tx1"/>
-                </a:solidFill>
-                <a:latin typeface="Segoe UI" panose="020B0502040204020203" pitchFamily="34" charset="0"/>
-              </a:rPr>
-            </a:br>
-            <a:endParaRPr lang="en-US" sz="3236" dirty="0">
-              <a:solidFill>
-                <a:schemeClr val="tx1"/>
-              </a:solidFill>
-              <a:latin typeface="Segoe UI" panose="020B0502040204020203" pitchFamily="34" charset="0"/>
             </a:endParaRPr>
           </a:p>
         </p:txBody>
@@ -19369,6 +19369,54 @@
       </p:grpSpPr>
       <p:sp>
         <p:nvSpPr>
+          <p:cNvPr id="2" name="Title 1"/>
+          <p:cNvSpPr>
+            <a:spLocks noGrp="1"/>
+          </p:cNvSpPr>
+          <p:nvPr>
+            <p:ph type="title"/>
+          </p:nvPr>
+        </p:nvSpPr>
+        <p:spPr>
+          <a:xfrm>
+            <a:off x="269240" y="289511"/>
+            <a:ext cx="11655840" cy="800735"/>
+          </a:xfrm>
+        </p:spPr>
+        <p:txBody>
+          <a:bodyPr>
+            <a:normAutofit fontScale="90000"/>
+          </a:bodyPr>
+          <a:lstStyle/>
+          <a:p>
+            <a:r>
+              <a:rPr lang="en-US" sz="4900" dirty="0">
+                <a:solidFill>
+                  <a:schemeClr val="tx1"/>
+                </a:solidFill>
+                <a:cs typeface="Segoe UI" panose="020B0502040204020203" pitchFamily="34" charset="0"/>
+              </a:rPr>
+              <a:t>Preferred objections handling (4)</a:t>
+            </a:r>
+            <a:br>
+              <a:rPr lang="en-US" dirty="0">
+                <a:solidFill>
+                  <a:schemeClr val="tx1"/>
+                </a:solidFill>
+                <a:latin typeface="Segoe UI" panose="020B0502040204020203" pitchFamily="34" charset="0"/>
+              </a:rPr>
+            </a:br>
+            <a:endParaRPr lang="en-US" sz="3236" dirty="0">
+              <a:solidFill>
+                <a:schemeClr val="tx1"/>
+              </a:solidFill>
+              <a:latin typeface="Segoe UI" panose="020B0502040204020203" pitchFamily="34" charset="0"/>
+            </a:endParaRPr>
+          </a:p>
+        </p:txBody>
+      </p:sp>
+      <p:sp>
+        <p:nvSpPr>
           <p:cNvPr id="3" name="Content Placeholder 2"/>
           <p:cNvSpPr>
             <a:spLocks noGrp="1"/>
@@ -19427,54 +19475,6 @@
               <a:solidFill>
                 <a:schemeClr val="tx1"/>
               </a:solidFill>
-            </a:endParaRPr>
-          </a:p>
-        </p:txBody>
-      </p:sp>
-      <p:sp>
-        <p:nvSpPr>
-          <p:cNvPr id="2" name="Title 1"/>
-          <p:cNvSpPr>
-            <a:spLocks noGrp="1"/>
-          </p:cNvSpPr>
-          <p:nvPr>
-            <p:ph type="title"/>
-          </p:nvPr>
-        </p:nvSpPr>
-        <p:spPr>
-          <a:xfrm>
-            <a:off x="269240" y="289511"/>
-            <a:ext cx="11655840" cy="800735"/>
-          </a:xfrm>
-        </p:spPr>
-        <p:txBody>
-          <a:bodyPr>
-            <a:normAutofit fontScale="90000"/>
-          </a:bodyPr>
-          <a:lstStyle/>
-          <a:p>
-            <a:r>
-              <a:rPr lang="en-US" sz="4900" dirty="0">
-                <a:solidFill>
-                  <a:schemeClr val="tx1"/>
-                </a:solidFill>
-                <a:cs typeface="Segoe UI" panose="020B0502040204020203" pitchFamily="34" charset="0"/>
-              </a:rPr>
-              <a:t>Preferred objections handling (4)</a:t>
-            </a:r>
-            <a:br>
-              <a:rPr lang="en-US" dirty="0">
-                <a:solidFill>
-                  <a:schemeClr val="tx1"/>
-                </a:solidFill>
-                <a:latin typeface="Segoe UI" panose="020B0502040204020203" pitchFamily="34" charset="0"/>
-              </a:rPr>
-            </a:br>
-            <a:endParaRPr lang="en-US" sz="3236" dirty="0">
-              <a:solidFill>
-                <a:schemeClr val="tx1"/>
-              </a:solidFill>
-              <a:latin typeface="Segoe UI" panose="020B0502040204020203" pitchFamily="34" charset="0"/>
             </a:endParaRPr>
           </a:p>
         </p:txBody>
@@ -19701,6 +19701,49 @@
       </p:grpSpPr>
       <p:sp>
         <p:nvSpPr>
+          <p:cNvPr id="2" name="Title 1"/>
+          <p:cNvSpPr>
+            <a:spLocks noGrp="1"/>
+          </p:cNvSpPr>
+          <p:nvPr>
+            <p:ph type="title"/>
+          </p:nvPr>
+        </p:nvSpPr>
+        <p:spPr/>
+        <p:txBody>
+          <a:bodyPr>
+            <a:normAutofit fontScale="90000"/>
+          </a:bodyPr>
+          <a:lstStyle/>
+          <a:p>
+            <a:r>
+              <a:rPr lang="en-US" sz="4900" dirty="0">
+                <a:solidFill>
+                  <a:schemeClr val="tx1"/>
+                </a:solidFill>
+                <a:cs typeface="Segoe UI" panose="020B0502040204020203" pitchFamily="34" charset="0"/>
+              </a:rPr>
+              <a:t>Customer quote</a:t>
+            </a:r>
+            <a:br>
+              <a:rPr lang="en-US" dirty="0">
+                <a:solidFill>
+                  <a:schemeClr val="tx1"/>
+                </a:solidFill>
+                <a:latin typeface="Segoe UI" panose="020B0502040204020203" pitchFamily="34" charset="0"/>
+              </a:rPr>
+            </a:br>
+            <a:endParaRPr lang="en-US" sz="3236" dirty="0">
+              <a:solidFill>
+                <a:schemeClr val="tx1"/>
+              </a:solidFill>
+              <a:latin typeface="Segoe UI" panose="020B0502040204020203" pitchFamily="34" charset="0"/>
+            </a:endParaRPr>
+          </a:p>
+        </p:txBody>
+      </p:sp>
+      <p:sp>
+        <p:nvSpPr>
           <p:cNvPr id="3" name="Content Placeholder 2"/>
           <p:cNvSpPr>
             <a:spLocks noGrp="1"/>
@@ -19770,49 +19813,6 @@
               <a:solidFill>
                 <a:schemeClr val="tx1"/>
               </a:solidFill>
-            </a:endParaRPr>
-          </a:p>
-        </p:txBody>
-      </p:sp>
-      <p:sp>
-        <p:nvSpPr>
-          <p:cNvPr id="2" name="Title 1"/>
-          <p:cNvSpPr>
-            <a:spLocks noGrp="1"/>
-          </p:cNvSpPr>
-          <p:nvPr>
-            <p:ph type="title"/>
-          </p:nvPr>
-        </p:nvSpPr>
-        <p:spPr/>
-        <p:txBody>
-          <a:bodyPr>
-            <a:normAutofit fontScale="90000"/>
-          </a:bodyPr>
-          <a:lstStyle/>
-          <a:p>
-            <a:r>
-              <a:rPr lang="en-US" sz="4900" dirty="0">
-                <a:solidFill>
-                  <a:schemeClr val="tx1"/>
-                </a:solidFill>
-                <a:cs typeface="Segoe UI" panose="020B0502040204020203" pitchFamily="34" charset="0"/>
-              </a:rPr>
-              <a:t>Customer quote</a:t>
-            </a:r>
-            <a:br>
-              <a:rPr lang="en-US" dirty="0">
-                <a:solidFill>
-                  <a:schemeClr val="tx1"/>
-                </a:solidFill>
-                <a:latin typeface="Segoe UI" panose="020B0502040204020203" pitchFamily="34" charset="0"/>
-              </a:rPr>
-            </a:br>
-            <a:endParaRPr lang="en-US" sz="3236" dirty="0">
-              <a:solidFill>
-                <a:schemeClr val="tx1"/>
-              </a:solidFill>
-              <a:latin typeface="Segoe UI" panose="020B0502040204020203" pitchFamily="34" charset="0"/>
             </a:endParaRPr>
           </a:p>
         </p:txBody>
@@ -19948,88 +19948,6 @@
           </a:p>
         </p:txBody>
       </p:sp>
-      <p:sp>
-        <p:nvSpPr>
-          <p:cNvPr id="3" name="Content Placeholder 2"/>
-          <p:cNvSpPr>
-            <a:spLocks noGrp="1"/>
-          </p:cNvSpPr>
-          <p:nvPr>
-            <p:ph type="body" sz="quarter" idx="10"/>
-          </p:nvPr>
-        </p:nvSpPr>
-        <p:spPr>
-          <a:xfrm>
-            <a:off x="269240" y="1189176"/>
-            <a:ext cx="7585222" cy="5563315"/>
-          </a:xfrm>
-        </p:spPr>
-        <p:txBody>
-          <a:bodyPr>
-            <a:normAutofit lnSpcReduction="10000"/>
-          </a:bodyPr>
-          <a:lstStyle/>
-          <a:p>
-            <a:r>
-              <a:rPr lang="en-US" sz="2400" dirty="0">
-                <a:solidFill>
-                  <a:schemeClr val="tx1"/>
-                </a:solidFill>
-              </a:rPr>
-              <a:t>Trey Research Inc. delivers innovative solutions for manufacturers. </a:t>
-            </a:r>
-          </a:p>
-          <a:p>
-            <a:r>
-              <a:rPr lang="en-US" sz="2400" dirty="0">
-                <a:solidFill>
-                  <a:schemeClr val="tx1"/>
-                </a:solidFill>
-              </a:rPr>
-              <a:t>They specialize in identifying and solving problems for manufacturers that can run the range from automating away mundane but time-intensive processes to delivering cutting edge approaches that provide new opportunities for their manufacturing clients. </a:t>
-            </a:r>
-          </a:p>
-          <a:p>
-            <a:r>
-              <a:rPr lang="en-US" sz="2400" dirty="0"/>
-              <a:t>Trey Research is looking to provide the next generation experience for connected car manufacturers by enabling them to utilize AI to decide when to pro-actively reach out to the customer thru alerts delivered directly to the car's in-dash information and entertainment head unit. </a:t>
-            </a:r>
-          </a:p>
-          <a:p>
-            <a:r>
-              <a:rPr lang="en-US" sz="2400" dirty="0"/>
-              <a:t>For their PoC, they would like to focus on two maintenance related scenarios.</a:t>
-            </a:r>
-          </a:p>
-          <a:p>
-            <a:endParaRPr lang="en-US" sz="2400" dirty="0">
-              <a:solidFill>
-                <a:schemeClr val="tx1"/>
-              </a:solidFill>
-            </a:endParaRPr>
-          </a:p>
-          <a:p>
-            <a:endParaRPr lang="en-US" sz="2400" dirty="0">
-              <a:solidFill>
-                <a:schemeClr val="tx1"/>
-              </a:solidFill>
-            </a:endParaRPr>
-          </a:p>
-          <a:p>
-            <a:pPr marL="0" indent="0">
-              <a:spcAft>
-                <a:spcPts val="882"/>
-              </a:spcAft>
-              <a:buNone/>
-            </a:pPr>
-            <a:endParaRPr lang="en-US" sz="2400" dirty="0">
-              <a:solidFill>
-                <a:schemeClr val="tx1"/>
-              </a:solidFill>
-            </a:endParaRPr>
-          </a:p>
-        </p:txBody>
-      </p:sp>
       <p:pic>
         <p:nvPicPr>
           <p:cNvPr id="8" name="Graphic 7" descr="Statistics icon">
@@ -20069,6 +19987,88 @@
           </a:prstGeom>
         </p:spPr>
       </p:pic>
+      <p:sp>
+        <p:nvSpPr>
+          <p:cNvPr id="3" name="Content Placeholder 2"/>
+          <p:cNvSpPr>
+            <a:spLocks noGrp="1"/>
+          </p:cNvSpPr>
+          <p:nvPr>
+            <p:ph type="body" sz="quarter" idx="10"/>
+          </p:nvPr>
+        </p:nvSpPr>
+        <p:spPr>
+          <a:xfrm>
+            <a:off x="269240" y="1189176"/>
+            <a:ext cx="7585222" cy="5563315"/>
+          </a:xfrm>
+        </p:spPr>
+        <p:txBody>
+          <a:bodyPr>
+            <a:normAutofit lnSpcReduction="10000"/>
+          </a:bodyPr>
+          <a:lstStyle/>
+          <a:p>
+            <a:r>
+              <a:rPr lang="en-US" sz="2400" dirty="0">
+                <a:solidFill>
+                  <a:schemeClr val="tx1"/>
+                </a:solidFill>
+              </a:rPr>
+              <a:t>Trey Research Inc. delivers innovative solutions for manufacturers. </a:t>
+            </a:r>
+          </a:p>
+          <a:p>
+            <a:r>
+              <a:rPr lang="en-US" sz="2400" dirty="0">
+                <a:solidFill>
+                  <a:schemeClr val="tx1"/>
+                </a:solidFill>
+              </a:rPr>
+              <a:t>They specialize in identifying and solving problems for manufacturers that can run the range from automating away mundane but time-intensive processes to delivering cutting edge approaches that provide new opportunities for their manufacturing clients. </a:t>
+            </a:r>
+          </a:p>
+          <a:p>
+            <a:r>
+              <a:rPr lang="en-US" sz="2400" dirty="0"/>
+              <a:t>Trey Research is looking to provide the next generation experience for connected car manufacturers by enabling them to utilize AI to decide when to pro-actively reach out to the customer thru alerts delivered directly to the car's in-dash information and entertainment head unit. </a:t>
+            </a:r>
+          </a:p>
+          <a:p>
+            <a:r>
+              <a:rPr lang="en-US" sz="2400" dirty="0"/>
+              <a:t>For their PoC, they would like to focus on two maintenance related scenarios.</a:t>
+            </a:r>
+          </a:p>
+          <a:p>
+            <a:endParaRPr lang="en-US" sz="2400" dirty="0">
+              <a:solidFill>
+                <a:schemeClr val="tx1"/>
+              </a:solidFill>
+            </a:endParaRPr>
+          </a:p>
+          <a:p>
+            <a:endParaRPr lang="en-US" sz="2400" dirty="0">
+              <a:solidFill>
+                <a:schemeClr val="tx1"/>
+              </a:solidFill>
+            </a:endParaRPr>
+          </a:p>
+          <a:p>
+            <a:pPr marL="0" indent="0">
+              <a:spcAft>
+                <a:spcPts val="882"/>
+              </a:spcAft>
+              <a:buNone/>
+            </a:pPr>
+            <a:endParaRPr lang="en-US" sz="2400" dirty="0">
+              <a:solidFill>
+                <a:schemeClr val="tx1"/>
+              </a:solidFill>
+            </a:endParaRPr>
+          </a:p>
+        </p:txBody>
+      </p:sp>
       <p:pic>
         <p:nvPicPr>
           <p:cNvPr id="6" name="Graphic 5" descr="Car icon">
@@ -20148,6 +20148,49 @@
       </p:grpSpPr>
       <p:sp>
         <p:nvSpPr>
+          <p:cNvPr id="2" name="Title 1"/>
+          <p:cNvSpPr>
+            <a:spLocks noGrp="1"/>
+          </p:cNvSpPr>
+          <p:nvPr>
+            <p:ph type="title"/>
+          </p:nvPr>
+        </p:nvSpPr>
+        <p:spPr/>
+        <p:txBody>
+          <a:bodyPr>
+            <a:normAutofit fontScale="90000"/>
+          </a:bodyPr>
+          <a:lstStyle/>
+          <a:p>
+            <a:r>
+              <a:rPr lang="en-US" sz="4900" dirty="0">
+                <a:solidFill>
+                  <a:schemeClr val="tx1"/>
+                </a:solidFill>
+                <a:cs typeface="Segoe UI" panose="020B0502040204020203" pitchFamily="34" charset="0"/>
+              </a:rPr>
+              <a:t>Customer situation – requirements</a:t>
+            </a:r>
+            <a:br>
+              <a:rPr lang="en-US" dirty="0">
+                <a:solidFill>
+                  <a:schemeClr val="tx1"/>
+                </a:solidFill>
+                <a:latin typeface="Segoe UI" panose="020B0502040204020203" pitchFamily="34" charset="0"/>
+              </a:rPr>
+            </a:br>
+            <a:endParaRPr lang="en-US" sz="3236" dirty="0">
+              <a:solidFill>
+                <a:schemeClr val="tx1"/>
+              </a:solidFill>
+              <a:latin typeface="Segoe UI" panose="020B0502040204020203" pitchFamily="34" charset="0"/>
+            </a:endParaRPr>
+          </a:p>
+        </p:txBody>
+      </p:sp>
+      <p:sp>
+        <p:nvSpPr>
           <p:cNvPr id="3" name="Content Placeholder 2"/>
           <p:cNvSpPr>
             <a:spLocks noGrp="1"/>
@@ -20219,49 +20262,6 @@
               <a:solidFill>
                 <a:schemeClr val="tx1"/>
               </a:solidFill>
-            </a:endParaRPr>
-          </a:p>
-        </p:txBody>
-      </p:sp>
-      <p:sp>
-        <p:nvSpPr>
-          <p:cNvPr id="2" name="Title 1"/>
-          <p:cNvSpPr>
-            <a:spLocks noGrp="1"/>
-          </p:cNvSpPr>
-          <p:nvPr>
-            <p:ph type="title"/>
-          </p:nvPr>
-        </p:nvSpPr>
-        <p:spPr/>
-        <p:txBody>
-          <a:bodyPr>
-            <a:normAutofit fontScale="90000"/>
-          </a:bodyPr>
-          <a:lstStyle/>
-          <a:p>
-            <a:r>
-              <a:rPr lang="en-US" sz="4900" dirty="0">
-                <a:solidFill>
-                  <a:schemeClr val="tx1"/>
-                </a:solidFill>
-                <a:cs typeface="Segoe UI" panose="020B0502040204020203" pitchFamily="34" charset="0"/>
-              </a:rPr>
-              <a:t>Customer situation – requirements</a:t>
-            </a:r>
-            <a:br>
-              <a:rPr lang="en-US" dirty="0">
-                <a:solidFill>
-                  <a:schemeClr val="tx1"/>
-                </a:solidFill>
-                <a:latin typeface="Segoe UI" panose="020B0502040204020203" pitchFamily="34" charset="0"/>
-              </a:rPr>
-            </a:br>
-            <a:endParaRPr lang="en-US" sz="3236" dirty="0">
-              <a:solidFill>
-                <a:schemeClr val="tx1"/>
-              </a:solidFill>
-              <a:latin typeface="Segoe UI" panose="020B0502040204020203" pitchFamily="34" charset="0"/>
             </a:endParaRPr>
           </a:p>
         </p:txBody>
@@ -20306,6 +20306,49 @@
       </p:grpSpPr>
       <p:sp>
         <p:nvSpPr>
+          <p:cNvPr id="2" name="Title 1"/>
+          <p:cNvSpPr>
+            <a:spLocks noGrp="1"/>
+          </p:cNvSpPr>
+          <p:nvPr>
+            <p:ph type="title"/>
+          </p:nvPr>
+        </p:nvSpPr>
+        <p:spPr/>
+        <p:txBody>
+          <a:bodyPr>
+            <a:normAutofit fontScale="90000"/>
+          </a:bodyPr>
+          <a:lstStyle/>
+          <a:p>
+            <a:r>
+              <a:rPr lang="en-US" sz="4900" dirty="0">
+                <a:solidFill>
+                  <a:schemeClr val="tx1"/>
+                </a:solidFill>
+                <a:cs typeface="Segoe UI" panose="020B0502040204020203" pitchFamily="34" charset="0"/>
+              </a:rPr>
+              <a:t>Customer situation – requirements (continued)</a:t>
+            </a:r>
+            <a:br>
+              <a:rPr lang="en-US" dirty="0">
+                <a:solidFill>
+                  <a:schemeClr val="tx1"/>
+                </a:solidFill>
+                <a:latin typeface="Segoe UI" panose="020B0502040204020203" pitchFamily="34" charset="0"/>
+              </a:rPr>
+            </a:br>
+            <a:endParaRPr lang="en-US" sz="3236" dirty="0">
+              <a:solidFill>
+                <a:schemeClr val="tx1"/>
+              </a:solidFill>
+              <a:latin typeface="Segoe UI" panose="020B0502040204020203" pitchFamily="34" charset="0"/>
+            </a:endParaRPr>
+          </a:p>
+        </p:txBody>
+      </p:sp>
+      <p:sp>
+        <p:nvSpPr>
           <p:cNvPr id="3" name="Content Placeholder 2"/>
           <p:cNvSpPr>
             <a:spLocks noGrp="1"/>
@@ -20381,49 +20424,6 @@
               <a:solidFill>
                 <a:schemeClr val="tx1"/>
               </a:solidFill>
-            </a:endParaRPr>
-          </a:p>
-        </p:txBody>
-      </p:sp>
-      <p:sp>
-        <p:nvSpPr>
-          <p:cNvPr id="2" name="Title 1"/>
-          <p:cNvSpPr>
-            <a:spLocks noGrp="1"/>
-          </p:cNvSpPr>
-          <p:nvPr>
-            <p:ph type="title"/>
-          </p:nvPr>
-        </p:nvSpPr>
-        <p:spPr/>
-        <p:txBody>
-          <a:bodyPr>
-            <a:normAutofit fontScale="90000"/>
-          </a:bodyPr>
-          <a:lstStyle/>
-          <a:p>
-            <a:r>
-              <a:rPr lang="en-US" sz="4900" dirty="0">
-                <a:solidFill>
-                  <a:schemeClr val="tx1"/>
-                </a:solidFill>
-                <a:cs typeface="Segoe UI" panose="020B0502040204020203" pitchFamily="34" charset="0"/>
-              </a:rPr>
-              <a:t>Customer situation – requirements (continued)</a:t>
-            </a:r>
-            <a:br>
-              <a:rPr lang="en-US" dirty="0">
-                <a:solidFill>
-                  <a:schemeClr val="tx1"/>
-                </a:solidFill>
-                <a:latin typeface="Segoe UI" panose="020B0502040204020203" pitchFamily="34" charset="0"/>
-              </a:rPr>
-            </a:br>
-            <a:endParaRPr lang="en-US" sz="3236" dirty="0">
-              <a:solidFill>
-                <a:schemeClr val="tx1"/>
-              </a:solidFill>
-              <a:latin typeface="Segoe UI" panose="020B0502040204020203" pitchFamily="34" charset="0"/>
             </a:endParaRPr>
           </a:p>
         </p:txBody>
@@ -20468,6 +20468,49 @@
       </p:grpSpPr>
       <p:sp>
         <p:nvSpPr>
+          <p:cNvPr id="2" name="Title 1"/>
+          <p:cNvSpPr>
+            <a:spLocks noGrp="1"/>
+          </p:cNvSpPr>
+          <p:nvPr>
+            <p:ph type="title"/>
+          </p:nvPr>
+        </p:nvSpPr>
+        <p:spPr/>
+        <p:txBody>
+          <a:bodyPr>
+            <a:normAutofit fontScale="90000"/>
+          </a:bodyPr>
+          <a:lstStyle/>
+          <a:p>
+            <a:r>
+              <a:rPr lang="en-US" sz="4900" dirty="0">
+                <a:solidFill>
+                  <a:schemeClr val="tx1"/>
+                </a:solidFill>
+                <a:cs typeface="Segoe UI" panose="020B0502040204020203" pitchFamily="34" charset="0"/>
+              </a:rPr>
+              <a:t>Customer needs</a:t>
+            </a:r>
+            <a:br>
+              <a:rPr lang="en-US" dirty="0">
+                <a:solidFill>
+                  <a:schemeClr val="tx1"/>
+                </a:solidFill>
+                <a:latin typeface="Segoe UI" panose="020B0502040204020203" pitchFamily="34" charset="0"/>
+              </a:rPr>
+            </a:br>
+            <a:endParaRPr lang="en-US" sz="3236" dirty="0">
+              <a:solidFill>
+                <a:schemeClr val="tx1"/>
+              </a:solidFill>
+              <a:latin typeface="Segoe UI" panose="020B0502040204020203" pitchFamily="34" charset="0"/>
+            </a:endParaRPr>
+          </a:p>
+        </p:txBody>
+      </p:sp>
+      <p:sp>
+        <p:nvSpPr>
           <p:cNvPr id="3" name="Content Placeholder 2"/>
           <p:cNvSpPr>
             <a:spLocks noGrp="1"/>
@@ -20508,49 +20551,6 @@
               </a:rPr>
               <a:t>Our board is concerned about the liability of not being able to justify and explain the function of the models we create. We recognize many models are not easily explained in layman's terms, but how can we go about documenting how our models make predictions generally or how why they made specific predictions for particular input?</a:t>
             </a:r>
-          </a:p>
-        </p:txBody>
-      </p:sp>
-      <p:sp>
-        <p:nvSpPr>
-          <p:cNvPr id="2" name="Title 1"/>
-          <p:cNvSpPr>
-            <a:spLocks noGrp="1"/>
-          </p:cNvSpPr>
-          <p:nvPr>
-            <p:ph type="title"/>
-          </p:nvPr>
-        </p:nvSpPr>
-        <p:spPr/>
-        <p:txBody>
-          <a:bodyPr>
-            <a:normAutofit fontScale="90000"/>
-          </a:bodyPr>
-          <a:lstStyle/>
-          <a:p>
-            <a:r>
-              <a:rPr lang="en-US" sz="4900" dirty="0">
-                <a:solidFill>
-                  <a:schemeClr val="tx1"/>
-                </a:solidFill>
-                <a:cs typeface="Segoe UI" panose="020B0502040204020203" pitchFamily="34" charset="0"/>
-              </a:rPr>
-              <a:t>Customer needs</a:t>
-            </a:r>
-            <a:br>
-              <a:rPr lang="en-US" dirty="0">
-                <a:solidFill>
-                  <a:schemeClr val="tx1"/>
-                </a:solidFill>
-                <a:latin typeface="Segoe UI" panose="020B0502040204020203" pitchFamily="34" charset="0"/>
-              </a:rPr>
-            </a:br>
-            <a:endParaRPr lang="en-US" sz="3236" dirty="0">
-              <a:solidFill>
-                <a:schemeClr val="tx1"/>
-              </a:solidFill>
-              <a:latin typeface="Segoe UI" panose="020B0502040204020203" pitchFamily="34" charset="0"/>
-            </a:endParaRPr>
           </a:p>
         </p:txBody>
       </p:sp>
@@ -20594,6 +20594,49 @@
       </p:grpSpPr>
       <p:sp>
         <p:nvSpPr>
+          <p:cNvPr id="2" name="Title 1"/>
+          <p:cNvSpPr>
+            <a:spLocks noGrp="1"/>
+          </p:cNvSpPr>
+          <p:nvPr>
+            <p:ph type="title"/>
+          </p:nvPr>
+        </p:nvSpPr>
+        <p:spPr/>
+        <p:txBody>
+          <a:bodyPr>
+            <a:normAutofit fontScale="90000"/>
+          </a:bodyPr>
+          <a:lstStyle/>
+          <a:p>
+            <a:r>
+              <a:rPr lang="en-US" sz="4900" dirty="0">
+                <a:solidFill>
+                  <a:schemeClr val="tx1"/>
+                </a:solidFill>
+                <a:cs typeface="Segoe UI" panose="020B0502040204020203" pitchFamily="34" charset="0"/>
+              </a:rPr>
+              <a:t>Customer needs - continued</a:t>
+            </a:r>
+            <a:br>
+              <a:rPr lang="en-US" dirty="0">
+                <a:solidFill>
+                  <a:schemeClr val="tx1"/>
+                </a:solidFill>
+                <a:latin typeface="Segoe UI" panose="020B0502040204020203" pitchFamily="34" charset="0"/>
+              </a:rPr>
+            </a:br>
+            <a:endParaRPr lang="en-US" sz="3236" dirty="0">
+              <a:solidFill>
+                <a:schemeClr val="tx1"/>
+              </a:solidFill>
+              <a:latin typeface="Segoe UI" panose="020B0502040204020203" pitchFamily="34" charset="0"/>
+            </a:endParaRPr>
+          </a:p>
+        </p:txBody>
+      </p:sp>
+      <p:sp>
+        <p:nvSpPr>
           <p:cNvPr id="3" name="Content Placeholder 2"/>
           <p:cNvSpPr>
             <a:spLocks noGrp="1"/>
@@ -20623,49 +20666,6 @@
               <a:rPr lang="en-US" sz="2400" dirty="0"/>
               <a:t>Know the data pipeline they need to build in Azure, from ingesting telemetry, to storing both the compliance text and battery telemetry, to visualizing the result.</a:t>
             </a:r>
-          </a:p>
-        </p:txBody>
-      </p:sp>
-      <p:sp>
-        <p:nvSpPr>
-          <p:cNvPr id="2" name="Title 1"/>
-          <p:cNvSpPr>
-            <a:spLocks noGrp="1"/>
-          </p:cNvSpPr>
-          <p:nvPr>
-            <p:ph type="title"/>
-          </p:nvPr>
-        </p:nvSpPr>
-        <p:spPr/>
-        <p:txBody>
-          <a:bodyPr>
-            <a:normAutofit fontScale="90000"/>
-          </a:bodyPr>
-          <a:lstStyle/>
-          <a:p>
-            <a:r>
-              <a:rPr lang="en-US" sz="4900" dirty="0">
-                <a:solidFill>
-                  <a:schemeClr val="tx1"/>
-                </a:solidFill>
-                <a:cs typeface="Segoe UI" panose="020B0502040204020203" pitchFamily="34" charset="0"/>
-              </a:rPr>
-              <a:t>Customer needs - continued</a:t>
-            </a:r>
-            <a:br>
-              <a:rPr lang="en-US" dirty="0">
-                <a:solidFill>
-                  <a:schemeClr val="tx1"/>
-                </a:solidFill>
-                <a:latin typeface="Segoe UI" panose="020B0502040204020203" pitchFamily="34" charset="0"/>
-              </a:rPr>
-            </a:br>
-            <a:endParaRPr lang="en-US" sz="3236" dirty="0">
-              <a:solidFill>
-                <a:schemeClr val="tx1"/>
-              </a:solidFill>
-              <a:latin typeface="Segoe UI" panose="020B0502040204020203" pitchFamily="34" charset="0"/>
-            </a:endParaRPr>
           </a:p>
         </p:txBody>
       </p:sp>
@@ -20709,6 +20709,49 @@
       </p:grpSpPr>
       <p:sp>
         <p:nvSpPr>
+          <p:cNvPr id="2" name="Title 1"/>
+          <p:cNvSpPr>
+            <a:spLocks noGrp="1"/>
+          </p:cNvSpPr>
+          <p:nvPr>
+            <p:ph type="title"/>
+          </p:nvPr>
+        </p:nvSpPr>
+        <p:spPr/>
+        <p:txBody>
+          <a:bodyPr>
+            <a:normAutofit fontScale="90000"/>
+          </a:bodyPr>
+          <a:lstStyle/>
+          <a:p>
+            <a:r>
+              <a:rPr lang="en-US" sz="4900" dirty="0">
+                <a:solidFill>
+                  <a:schemeClr val="tx1"/>
+                </a:solidFill>
+                <a:cs typeface="Segoe UI" panose="020B0502040204020203" pitchFamily="34" charset="0"/>
+              </a:rPr>
+              <a:t>Customer objections</a:t>
+            </a:r>
+            <a:br>
+              <a:rPr lang="en-US" dirty="0">
+                <a:solidFill>
+                  <a:schemeClr val="tx1"/>
+                </a:solidFill>
+                <a:latin typeface="Segoe UI" panose="020B0502040204020203" pitchFamily="34" charset="0"/>
+              </a:rPr>
+            </a:br>
+            <a:endParaRPr lang="en-US" sz="3236" dirty="0">
+              <a:solidFill>
+                <a:schemeClr val="tx1"/>
+              </a:solidFill>
+              <a:latin typeface="Segoe UI" panose="020B0502040204020203" pitchFamily="34" charset="0"/>
+            </a:endParaRPr>
+          </a:p>
+        </p:txBody>
+      </p:sp>
+      <p:sp>
+        <p:nvSpPr>
           <p:cNvPr id="3" name="Content Placeholder 2"/>
           <p:cNvSpPr>
             <a:spLocks noGrp="1"/>
@@ -20788,49 +20831,6 @@
               </a:rPr>
               <a:t>Some of our team has worked with Azure Databricks, and they are confused by the overlap with Azure Machine Learning. How should we be thinking about when to use which? </a:t>
             </a:r>
-          </a:p>
-        </p:txBody>
-      </p:sp>
-      <p:sp>
-        <p:nvSpPr>
-          <p:cNvPr id="2" name="Title 1"/>
-          <p:cNvSpPr>
-            <a:spLocks noGrp="1"/>
-          </p:cNvSpPr>
-          <p:nvPr>
-            <p:ph type="title"/>
-          </p:nvPr>
-        </p:nvSpPr>
-        <p:spPr/>
-        <p:txBody>
-          <a:bodyPr>
-            <a:normAutofit fontScale="90000"/>
-          </a:bodyPr>
-          <a:lstStyle/>
-          <a:p>
-            <a:r>
-              <a:rPr lang="en-US" sz="4900" dirty="0">
-                <a:solidFill>
-                  <a:schemeClr val="tx1"/>
-                </a:solidFill>
-                <a:cs typeface="Segoe UI" panose="020B0502040204020203" pitchFamily="34" charset="0"/>
-              </a:rPr>
-              <a:t>Customer objections</a:t>
-            </a:r>
-            <a:br>
-              <a:rPr lang="en-US" dirty="0">
-                <a:solidFill>
-                  <a:schemeClr val="tx1"/>
-                </a:solidFill>
-                <a:latin typeface="Segoe UI" panose="020B0502040204020203" pitchFamily="34" charset="0"/>
-              </a:rPr>
-            </a:br>
-            <a:endParaRPr lang="en-US" sz="3236" dirty="0">
-              <a:solidFill>
-                <a:schemeClr val="tx1"/>
-              </a:solidFill>
-              <a:latin typeface="Segoe UI" panose="020B0502040204020203" pitchFamily="34" charset="0"/>
-            </a:endParaRPr>
           </a:p>
         </p:txBody>
       </p:sp>
@@ -21721,15 +21721,6 @@
 </file>
 
 <file path=customXml/item1.xml><?xml version="1.0" encoding="utf-8"?>
-<?mso-contentType ?>
-<FormTemplates xmlns="http://schemas.microsoft.com/sharepoint/v3/contenttype/forms">
-  <Display>DocumentLibraryForm</Display>
-  <Edit>DocumentLibraryForm</Edit>
-  <New>DocumentLibraryForm</New>
-</FormTemplates>
-</file>
-
-<file path=customXml/item2.xml><?xml version="1.0" encoding="utf-8"?>
 <ct:contentTypeSchema xmlns:ct="http://schemas.microsoft.com/office/2006/metadata/contentType" xmlns:ma="http://schemas.microsoft.com/office/2006/metadata/properties/metaAttributes" ct:_="" ma:_="" ma:contentTypeName="Document" ma:contentTypeID="0x010100D15DFA3690A15B4081582BBCC6BEAC3E" ma:contentTypeVersion="9" ma:contentTypeDescription="Create a new document." ma:contentTypeScope="" ma:versionID="642da1784587cbe85a7fdbbe4dc36103">
   <xsd:schema xmlns:xsd="http://www.w3.org/2001/XMLSchema" xmlns:xs="http://www.w3.org/2001/XMLSchema" xmlns:p="http://schemas.microsoft.com/office/2006/metadata/properties" xmlns:ns1="http://schemas.microsoft.com/sharepoint/v3" xmlns:ns2="2023ac63-7b75-4916-a9ee-591457758eee" xmlns:ns3="d9c797ad-d7c3-4982-82b7-81352a75e4a5" targetNamespace="http://schemas.microsoft.com/office/2006/metadata/properties" ma:root="true" ma:fieldsID="91198b0246576053cc55dd2c67035a89" ns1:_="" ns2:_="" ns3:_="">
     <xsd:import namespace="http://schemas.microsoft.com/sharepoint/v3"/>
@@ -21931,6 +21922,15 @@
 </ct:contentTypeSchema>
 </file>
 
+<file path=customXml/item2.xml><?xml version="1.0" encoding="utf-8"?>
+<?mso-contentType ?>
+<FormTemplates xmlns="http://schemas.microsoft.com/sharepoint/v3/contenttype/forms">
+  <Display>DocumentLibraryForm</Display>
+  <Edit>DocumentLibraryForm</Edit>
+  <New>DocumentLibraryForm</New>
+</FormTemplates>
+</file>
+
 <file path=customXml/item3.xml><?xml version="1.0" encoding="utf-8"?>
 <p:properties xmlns:p="http://schemas.microsoft.com/office/2006/metadata/properties" xmlns:xsi="http://www.w3.org/2001/XMLSchema-instance" xmlns:pc="http://schemas.microsoft.com/office/infopath/2007/PartnerControls">
   <documentManagement>
@@ -21941,14 +21941,6 @@
 </file>
 
 <file path=customXml/itemProps1.xml><?xml version="1.0" encoding="utf-8"?>
-<ds:datastoreItem xmlns:ds="http://schemas.openxmlformats.org/officeDocument/2006/customXml" ds:itemID="{F18501AF-04CF-4482-BAE1-607B49DDC378}">
-  <ds:schemaRefs>
-    <ds:schemaRef ds:uri="http://schemas.microsoft.com/sharepoint/v3/contenttype/forms"/>
-  </ds:schemaRefs>
-</ds:datastoreItem>
-</file>
-
-<file path=customXml/itemProps2.xml><?xml version="1.0" encoding="utf-8"?>
 <ds:datastoreItem xmlns:ds="http://schemas.openxmlformats.org/officeDocument/2006/customXml" ds:itemID="{255F5BEB-6AD6-480A-8556-C80C5EBC10F2}">
   <ds:schemaRefs>
     <ds:schemaRef ds:uri="http://schemas.microsoft.com/office/2006/metadata/contentType"/>
@@ -21968,20 +21960,28 @@
 </ds:datastoreItem>
 </file>
 
+<file path=customXml/itemProps2.xml><?xml version="1.0" encoding="utf-8"?>
+<ds:datastoreItem xmlns:ds="http://schemas.openxmlformats.org/officeDocument/2006/customXml" ds:itemID="{F18501AF-04CF-4482-BAE1-607B49DDC378}">
+  <ds:schemaRefs>
+    <ds:schemaRef ds:uri="http://schemas.microsoft.com/sharepoint/v3/contenttype/forms"/>
+  </ds:schemaRefs>
+</ds:datastoreItem>
+</file>
+
 <file path=customXml/itemProps3.xml><?xml version="1.0" encoding="utf-8"?>
 <ds:datastoreItem xmlns:ds="http://schemas.openxmlformats.org/officeDocument/2006/customXml" ds:itemID="{BAF7D529-36AB-45DA-B239-2F912F2D1610}">
   <ds:schemaRefs>
+    <ds:schemaRef ds:uri="http://schemas.openxmlformats.org/package/2006/metadata/core-properties"/>
+    <ds:schemaRef ds:uri="http://purl.org/dc/terms/"/>
+    <ds:schemaRef ds:uri="http://schemas.microsoft.com/office/infopath/2007/PartnerControls"/>
+    <ds:schemaRef ds:uri="http://purl.org/dc/dcmitype/"/>
+    <ds:schemaRef ds:uri="d9c797ad-d7c3-4982-82b7-81352a75e4a5"/>
+    <ds:schemaRef ds:uri="http://schemas.microsoft.com/office/2006/documentManagement/types"/>
+    <ds:schemaRef ds:uri="http://schemas.microsoft.com/office/2006/metadata/properties"/>
+    <ds:schemaRef ds:uri="2023ac63-7b75-4916-a9ee-591457758eee"/>
+    <ds:schemaRef ds:uri="http://schemas.microsoft.com/sharepoint/v3"/>
     <ds:schemaRef ds:uri="http://www.w3.org/XML/1998/namespace"/>
-    <ds:schemaRef ds:uri="http://schemas.microsoft.com/office/2006/documentManagement/types"/>
-    <ds:schemaRef ds:uri="http://schemas.microsoft.com/office/infopath/2007/PartnerControls"/>
-    <ds:schemaRef ds:uri="http://schemas.openxmlformats.org/package/2006/metadata/core-properties"/>
-    <ds:schemaRef ds:uri="http://schemas.microsoft.com/sharepoint/v3"/>
-    <ds:schemaRef ds:uri="d9c797ad-d7c3-4982-82b7-81352a75e4a5"/>
-    <ds:schemaRef ds:uri="2023ac63-7b75-4916-a9ee-591457758eee"/>
     <ds:schemaRef ds:uri="http://purl.org/dc/elements/1.1/"/>
-    <ds:schemaRef ds:uri="http://schemas.microsoft.com/office/2006/metadata/properties"/>
-    <ds:schemaRef ds:uri="http://purl.org/dc/dcmitype/"/>
-    <ds:schemaRef ds:uri="http://purl.org/dc/terms/"/>
   </ds:schemaRefs>
 </ds:datastoreItem>
 </file>
</xml_diff>

<commit_message>
March 2020 update plus issues #20, #21, #22
</commit_message>
<xml_diff>
--- a/Whiteboard design session/WDS trainer presentation - Machine Learning.pptx
+++ b/Whiteboard design session/WDS trainer presentation - Machine Learning.pptx
@@ -237,7 +237,7 @@
           <a:p>
             <a:fld id="{52A13B17-C506-4D51-BB37-16B365906619}" type="datetimeFigureOut">
               <a:rPr lang="en-US" smtClean="0"/>
-              <a:t>12/10/2019</a:t>
+              <a:t>3/9/20</a:t>
             </a:fld>
             <a:endParaRPr lang="en-US" dirty="0"/>
           </a:p>
@@ -2726,7 +2726,7 @@
                   <a:prstClr val="black"/>
                 </a:solidFill>
               </a:rPr>
-              <a:t>12/10/2019 11:35 AM</a:t>
+              <a:t>3/9/20 10:11 AM</a:t>
             </a:fld>
             <a:endParaRPr lang="en-US" dirty="0">
               <a:solidFill>
@@ -16882,7 +16882,7 @@
         </p:spPr>
         <p:txBody>
           <a:bodyPr>
-            <a:normAutofit fontScale="85000" lnSpcReduction="10000"/>
+            <a:normAutofit fontScale="92500" lnSpcReduction="20000"/>
           </a:bodyPr>
           <a:lstStyle/>
           <a:p>
@@ -17358,7 +17358,15 @@
             </a:pPr>
             <a:r>
               <a:rPr lang="en-US" sz="1800" dirty="0"/>
-              <a:t>Trey would author a notebook that loads the labeled component description data and creates the word embeddings representation of data. They could start with a simple sequential neural network consisting of an input layer (one neuron for each "word"), a fully connected layer consisting of significantly fewer neurons than embeddings with a non-linear activation function (such as ReLu), followed by a fully connected layer consisting of a single neuron with an activation function (such as Sigmoid). Only after performing hyper-parameter tuning or iterating on how the prepare the data, would they likely consider a more complex network architecture like a recurrent neural network (RNN). </a:t>
+              <a:t>Trey would author a notebook that loads the labeled component description data and preprocesses the data to vectorize the text corpus. Next, it builds a fully connected deep learning network. The first layer in the network is the embedding layer that uses a pretrained word embeddings, such as the </a:t>
+            </a:r>
+            <a:r>
+              <a:rPr lang="en-US" sz="1800" dirty="0" err="1"/>
+              <a:t>GloVe</a:t>
+            </a:r>
+            <a:r>
+              <a:rPr lang="en-US" sz="1800" dirty="0"/>
+              <a:t>: Global Vectors for Word Representation, to convert the vectorized text corpus to its corresponding word vectors. The embedding layer feeds into a Long Short-Term Memory (LSTM) recurrent neural network and the output from the LSTM is passed to a final layer consisting of a single neuron with a Sigmoid activation function. The output of the final layer will predict if the component description is compliant or not compliant.</a:t>
             </a:r>
           </a:p>
           <a:p>
@@ -17732,8 +17740,8 @@
         </p:nvSpPr>
         <p:spPr>
           <a:xfrm>
-            <a:off x="377863" y="1290309"/>
-            <a:ext cx="10984207" cy="5059847"/>
+            <a:off x="377863" y="1179947"/>
+            <a:ext cx="10984207" cy="5543056"/>
           </a:xfrm>
           <a:prstGeom prst="rect">
             <a:avLst/>
@@ -17746,30 +17754,21 @@
           </a:bodyPr>
           <a:lstStyle/>
           <a:p>
-            <a:r>
-              <a:rPr lang="en-US" sz="2400" dirty="0"/>
-              <a:t>In this whiteboard design session, you will work with a group to design and implement a solution that combines Azure Databricks with Azure Machine Learning to build, train and deploy the machine learning and deep learning models. You will learn how to use automated machine learning, model lifecycle management from training to deployment, in batch and real-time inferencing scenarios, and construct deep learning models for Natural Language Processing (NLP) in text classification and forecasting against time-series data.  Finally, you’ll learn to compare data with PyTorch and Keras for deep learning.</a:t>
-            </a:r>
-          </a:p>
-          <a:p>
-            <a:endParaRPr lang="en-US" sz="2400" dirty="0"/>
-          </a:p>
-          <a:p>
-            <a:r>
-              <a:rPr lang="en-US" sz="2400" dirty="0"/>
-              <a:t>At the end of this workshop, you will have a deeper understanding of the capabilities and implementation solutions when leveraging the Azure Machine Learning and Azure Databricks.</a:t>
-            </a:r>
-          </a:p>
-          <a:p>
             <a:pPr>
-              <a:lnSpc>
-                <a:spcPct val="90000"/>
-              </a:lnSpc>
               <a:spcAft>
                 <a:spcPts val="600"/>
               </a:spcAft>
             </a:pPr>
-            <a:endParaRPr lang="en-US" sz="2400" dirty="0"/>
+            <a:r>
+              <a:rPr lang="en-US" sz="2400" dirty="0"/>
+              <a:t>In this whiteboard design session, you will work with a group to design and implement a solution that combines Azure Databricks with Azure Machine Learning to build, train and deploy the machine learning and deep learning models. You will learn how to use automated machine learning, model lifecycle management from training to deployment, in batch and real-time inferencing scenarios, and construct deep learning models for Natural Language Processing (NLP) in text classification and forecasting against time-series data.  You will also learn how to use MLflow for managing experiments run directly on the Azure Databricks cluster and how MLflow can seamlessly log metrics and training artifacts in your Azure Machine Learning workspace. Finally, you’ll learn to compare data with PyTorch and Keras for deep learning.</a:t>
+            </a:r>
+          </a:p>
+          <a:p>
+            <a:r>
+              <a:rPr lang="en-US" sz="2400" dirty="0"/>
+              <a:t>At the end of this workshop, you will have a deeper understanding of the capabilities and implementation solutions when leveraging the Azure Machine Learning and Azure Databricks.</a:t>
+            </a:r>
           </a:p>
         </p:txBody>
       </p:sp>
@@ -18270,7 +18269,7 @@
             </a:pPr>
             <a:r>
               <a:rPr lang="en-US" sz="1800" dirty="0"/>
-              <a:t>Within their notebooks that perform model training, Trey should be using the Azure Machine Learning Python SDK to create an experiment for session. Within this experiment they can create a run each time they train the model and capture logs, the training time taken and any performance metrics that result from the model evaluation. </a:t>
+              <a:t>There are two approaches to manage the life cycle of the machine learning experiments. In the first approach, within their notebooks that perform model training, Trey should be using the Azure Machine Learning Python SDK to create an experiment for session. Within this experiment they can create a run each time they train the model and capture logs, the training time taken and any performance metrics that result from the model evaluation. In the second approach, they can continue to leverage their existing investments in MLflow and simply connect the MLflow experiments with Azure Machine Learning. By doing so it will enable Trey to automatically track and log experiment metrics in artifacts in the Azure Machine Learning workspace. Thus, Trey can also take advantage of the Azure Machine Learning workspace that provides a centralized, secure, and scalable location to store training metrics and models. </a:t>
             </a:r>
           </a:p>
           <a:p>
@@ -18296,36 +18295,6 @@
               <a:rPr lang="en-US" sz="1800" dirty="0"/>
               <a:t>Once the data is for an experiment is collected in the Azure Machine Learning workspace, Trey can view it from the Experiments tab of the Azure Machine Learning studio. From here they can drill into each run and explore the run details. Using the Azure Machine Learning Python SDK from a notebook, Trey can retrieve all of the experiments and run details and evaluate them programmatically (for example to pick the best run according to some custom logic).</a:t>
             </a:r>
-          </a:p>
-          <a:p>
-            <a:pPr marL="0" indent="0">
-              <a:buNone/>
-            </a:pPr>
-            <a:endParaRPr lang="en-US" sz="1800" b="1" i="1" dirty="0"/>
-          </a:p>
-          <a:p>
-            <a:pPr marL="0" indent="0">
-              <a:buNone/>
-            </a:pPr>
-            <a:r>
-              <a:rPr lang="en-US" sz="1800" b="1" i="1" dirty="0"/>
-              <a:t>How would they manage versioning of each the models they have created and associate these models with the results of evaluating their performance?</a:t>
-            </a:r>
-          </a:p>
-          <a:p>
-            <a:pPr marL="0" indent="0">
-              <a:buNone/>
-            </a:pPr>
-            <a:r>
-              <a:rPr lang="en-US" sz="1800" dirty="0"/>
-              <a:t>When they complete a training run for a model they would like to keep, Trey can use the Azure Machine Learning Python SDK to register the model in its registry. Each time they register a model with the same name, Azure Machine Learning will automatically version the model and add the new model to the version history. They can register models using the run, and by doing so will automatically associate the model with run and the performance metrics it contains.</a:t>
-            </a:r>
-          </a:p>
-          <a:p>
-            <a:pPr marL="0" indent="0">
-              <a:buNone/>
-            </a:pPr>
-            <a:endParaRPr lang="en-US" sz="1800" b="1" i="1" dirty="0"/>
           </a:p>
         </p:txBody>
       </p:sp>
@@ -18423,7 +18392,7 @@
         <p:spPr>
           <a:xfrm>
             <a:off x="266922" y="1939675"/>
-            <a:ext cx="11653523" cy="3115404"/>
+            <a:ext cx="11653523" cy="4114284"/>
           </a:xfrm>
         </p:spPr>
         <p:txBody>
@@ -18431,6 +18400,30 @@
             <a:noAutofit/>
           </a:bodyPr>
           <a:lstStyle/>
+          <a:p>
+            <a:pPr marL="0" indent="0">
+              <a:buNone/>
+            </a:pPr>
+            <a:r>
+              <a:rPr lang="en-US" sz="2000" b="1" i="1" dirty="0"/>
+              <a:t>How would they manage versioning of each the models they have created and associate these models with the results of evaluating their performance?</a:t>
+            </a:r>
+          </a:p>
+          <a:p>
+            <a:pPr marL="0" indent="0">
+              <a:buNone/>
+            </a:pPr>
+            <a:r>
+              <a:rPr lang="en-US" sz="2000" dirty="0"/>
+              <a:t>When they complete a training run for a model they would like to keep, Trey can use the Azure Machine Learning Python SDK to register the model in its registry. Each time they register a model with the same name, Azure Machine Learning will automatically version the model and add the new model to the version history. They can register models using the run, and by doing so will automatically associate the model with run and the performance metrics it contains.</a:t>
+            </a:r>
+          </a:p>
+          <a:p>
+            <a:pPr marL="0" indent="0">
+              <a:buNone/>
+            </a:pPr>
+            <a:endParaRPr lang="en-US" sz="2000" b="1" i="1" dirty="0"/>
+          </a:p>
           <a:p>
             <a:pPr marL="0" indent="0">
               <a:buNone/>
@@ -20005,7 +19998,7 @@
         </p:spPr>
         <p:txBody>
           <a:bodyPr>
-            <a:normAutofit lnSpcReduction="10000"/>
+            <a:normAutofit/>
           </a:bodyPr>
           <a:lstStyle/>
           <a:p>
@@ -20377,7 +20370,7 @@
           <a:p>
             <a:r>
               <a:rPr lang="en-US" sz="2800" dirty="0"/>
-              <a:t>They are also interested to learn what new capabilities Azure provides that might help them to document and explain the models that are created to non-data scientists or might accelerate their time to creating production ready, performant models. </a:t>
+              <a:t>They are also interested to learn what new capabilities Azure provides that might help them to integrate with their existing investments in MLflow for managing machine learning experiments. Furthermore, they would also like to understand how Azure might help them to document and explain the models that are created to non-data scientists or might accelerate their time to creating production ready, performant models. </a:t>
             </a:r>
           </a:p>
           <a:p>
@@ -20385,9 +20378,6 @@
               <a:rPr lang="en-US" sz="2800" dirty="0"/>
               <a:t>They would like to be able to easily create dashboards that summarize the alerts generated so they can observe the solution in operation. </a:t>
             </a:r>
-          </a:p>
-          <a:p>
-            <a:endParaRPr lang="en-US" sz="2800" dirty="0"/>
           </a:p>
           <a:p>
             <a:endParaRPr lang="en-US" sz="2800" dirty="0"/>
@@ -20532,7 +20522,7 @@
                   <a:schemeClr val="tx1"/>
                 </a:solidFill>
               </a:rPr>
-              <a:t>We would like to minimize the number of distinct technologies we need to apply across the data science process, from data collection, exploratory data analysis, data preparation, model training, model management and model deployment. How can Azure help us in this?</a:t>
+              <a:t>We would like to minimize the number of distinct technologies we need to apply across the data science process, from data collection, exploratory data analysis, data preparation, model training, model management and model deployment. We already have existing investments in MLflow. How can Azure help us in this?</a:t>
             </a:r>
           </a:p>
           <a:p>
@@ -21721,6 +21711,15 @@
 </file>
 
 <file path=customXml/item1.xml><?xml version="1.0" encoding="utf-8"?>
+<?mso-contentType ?>
+<FormTemplates xmlns="http://schemas.microsoft.com/sharepoint/v3/contenttype/forms">
+  <Display>DocumentLibraryForm</Display>
+  <Edit>DocumentLibraryForm</Edit>
+  <New>DocumentLibraryForm</New>
+</FormTemplates>
+</file>
+
+<file path=customXml/item2.xml><?xml version="1.0" encoding="utf-8"?>
 <ct:contentTypeSchema xmlns:ct="http://schemas.microsoft.com/office/2006/metadata/contentType" xmlns:ma="http://schemas.microsoft.com/office/2006/metadata/properties/metaAttributes" ct:_="" ma:_="" ma:contentTypeName="Document" ma:contentTypeID="0x010100D15DFA3690A15B4081582BBCC6BEAC3E" ma:contentTypeVersion="9" ma:contentTypeDescription="Create a new document." ma:contentTypeScope="" ma:versionID="642da1784587cbe85a7fdbbe4dc36103">
   <xsd:schema xmlns:xsd="http://www.w3.org/2001/XMLSchema" xmlns:xs="http://www.w3.org/2001/XMLSchema" xmlns:p="http://schemas.microsoft.com/office/2006/metadata/properties" xmlns:ns1="http://schemas.microsoft.com/sharepoint/v3" xmlns:ns2="2023ac63-7b75-4916-a9ee-591457758eee" xmlns:ns3="d9c797ad-d7c3-4982-82b7-81352a75e4a5" targetNamespace="http://schemas.microsoft.com/office/2006/metadata/properties" ma:root="true" ma:fieldsID="91198b0246576053cc55dd2c67035a89" ns1:_="" ns2:_="" ns3:_="">
     <xsd:import namespace="http://schemas.microsoft.com/sharepoint/v3"/>
@@ -21922,15 +21921,6 @@
 </ct:contentTypeSchema>
 </file>
 
-<file path=customXml/item2.xml><?xml version="1.0" encoding="utf-8"?>
-<?mso-contentType ?>
-<FormTemplates xmlns="http://schemas.microsoft.com/sharepoint/v3/contenttype/forms">
-  <Display>DocumentLibraryForm</Display>
-  <Edit>DocumentLibraryForm</Edit>
-  <New>DocumentLibraryForm</New>
-</FormTemplates>
-</file>
-
 <file path=customXml/item3.xml><?xml version="1.0" encoding="utf-8"?>
 <p:properties xmlns:p="http://schemas.microsoft.com/office/2006/metadata/properties" xmlns:xsi="http://www.w3.org/2001/XMLSchema-instance" xmlns:pc="http://schemas.microsoft.com/office/infopath/2007/PartnerControls">
   <documentManagement>
@@ -21941,6 +21931,14 @@
 </file>
 
 <file path=customXml/itemProps1.xml><?xml version="1.0" encoding="utf-8"?>
+<ds:datastoreItem xmlns:ds="http://schemas.openxmlformats.org/officeDocument/2006/customXml" ds:itemID="{F18501AF-04CF-4482-BAE1-607B49DDC378}">
+  <ds:schemaRefs>
+    <ds:schemaRef ds:uri="http://schemas.microsoft.com/sharepoint/v3/contenttype/forms"/>
+  </ds:schemaRefs>
+</ds:datastoreItem>
+</file>
+
+<file path=customXml/itemProps2.xml><?xml version="1.0" encoding="utf-8"?>
 <ds:datastoreItem xmlns:ds="http://schemas.openxmlformats.org/officeDocument/2006/customXml" ds:itemID="{255F5BEB-6AD6-480A-8556-C80C5EBC10F2}">
   <ds:schemaRefs>
     <ds:schemaRef ds:uri="http://schemas.microsoft.com/office/2006/metadata/contentType"/>
@@ -21956,14 +21954,6 @@
     <ds:schemaRef ds:uri="http://purl.org/dc/elements/1.1/"/>
     <ds:schemaRef ds:uri="http://purl.org/dc/terms/"/>
     <ds:schemaRef ds:uri="http://schemas.microsoft.com/internal/obd"/>
-  </ds:schemaRefs>
-</ds:datastoreItem>
-</file>
-
-<file path=customXml/itemProps2.xml><?xml version="1.0" encoding="utf-8"?>
-<ds:datastoreItem xmlns:ds="http://schemas.openxmlformats.org/officeDocument/2006/customXml" ds:itemID="{F18501AF-04CF-4482-BAE1-607B49DDC378}">
-  <ds:schemaRefs>
-    <ds:schemaRef ds:uri="http://schemas.microsoft.com/sharepoint/v3/contenttype/forms"/>
   </ds:schemaRefs>
 </ds:datastoreItem>
 </file>

</xml_diff>